<commit_message>
Design draft fixed, admin role added, creditCard (domain, repository, service) added
</commit_message>
<xml_diff>
--- a/Design draft.pptx
+++ b/Design draft.pptx
@@ -259,7 +259,7 @@
           <a:p>
             <a:fld id="{804FACE1-603D-405D-9BCD-7A01BF53AE91}" type="datetimeFigureOut">
               <a:rPr lang="it-IT" smtClean="0"/>
-              <a:t>27/02/2025</a:t>
+              <a:t>02/03/2025</a:t>
             </a:fld>
             <a:endParaRPr lang="it-IT"/>
           </a:p>
@@ -457,7 +457,7 @@
           <a:p>
             <a:fld id="{804FACE1-603D-405D-9BCD-7A01BF53AE91}" type="datetimeFigureOut">
               <a:rPr lang="it-IT" smtClean="0"/>
-              <a:t>27/02/2025</a:t>
+              <a:t>02/03/2025</a:t>
             </a:fld>
             <a:endParaRPr lang="it-IT"/>
           </a:p>
@@ -665,7 +665,7 @@
           <a:p>
             <a:fld id="{804FACE1-603D-405D-9BCD-7A01BF53AE91}" type="datetimeFigureOut">
               <a:rPr lang="it-IT" smtClean="0"/>
-              <a:t>27/02/2025</a:t>
+              <a:t>02/03/2025</a:t>
             </a:fld>
             <a:endParaRPr lang="it-IT"/>
           </a:p>
@@ -863,7 +863,7 @@
           <a:p>
             <a:fld id="{804FACE1-603D-405D-9BCD-7A01BF53AE91}" type="datetimeFigureOut">
               <a:rPr lang="it-IT" smtClean="0"/>
-              <a:t>27/02/2025</a:t>
+              <a:t>02/03/2025</a:t>
             </a:fld>
             <a:endParaRPr lang="it-IT"/>
           </a:p>
@@ -1138,7 +1138,7 @@
           <a:p>
             <a:fld id="{804FACE1-603D-405D-9BCD-7A01BF53AE91}" type="datetimeFigureOut">
               <a:rPr lang="it-IT" smtClean="0"/>
-              <a:t>27/02/2025</a:t>
+              <a:t>02/03/2025</a:t>
             </a:fld>
             <a:endParaRPr lang="it-IT"/>
           </a:p>
@@ -1403,7 +1403,7 @@
           <a:p>
             <a:fld id="{804FACE1-603D-405D-9BCD-7A01BF53AE91}" type="datetimeFigureOut">
               <a:rPr lang="it-IT" smtClean="0"/>
-              <a:t>27/02/2025</a:t>
+              <a:t>02/03/2025</a:t>
             </a:fld>
             <a:endParaRPr lang="it-IT"/>
           </a:p>
@@ -1815,7 +1815,7 @@
           <a:p>
             <a:fld id="{804FACE1-603D-405D-9BCD-7A01BF53AE91}" type="datetimeFigureOut">
               <a:rPr lang="it-IT" smtClean="0"/>
-              <a:t>27/02/2025</a:t>
+              <a:t>02/03/2025</a:t>
             </a:fld>
             <a:endParaRPr lang="it-IT"/>
           </a:p>
@@ -1956,7 +1956,7 @@
           <a:p>
             <a:fld id="{804FACE1-603D-405D-9BCD-7A01BF53AE91}" type="datetimeFigureOut">
               <a:rPr lang="it-IT" smtClean="0"/>
-              <a:t>27/02/2025</a:t>
+              <a:t>02/03/2025</a:t>
             </a:fld>
             <a:endParaRPr lang="it-IT"/>
           </a:p>
@@ -2069,7 +2069,7 @@
           <a:p>
             <a:fld id="{804FACE1-603D-405D-9BCD-7A01BF53AE91}" type="datetimeFigureOut">
               <a:rPr lang="it-IT" smtClean="0"/>
-              <a:t>27/02/2025</a:t>
+              <a:t>02/03/2025</a:t>
             </a:fld>
             <a:endParaRPr lang="it-IT"/>
           </a:p>
@@ -2380,7 +2380,7 @@
           <a:p>
             <a:fld id="{804FACE1-603D-405D-9BCD-7A01BF53AE91}" type="datetimeFigureOut">
               <a:rPr lang="it-IT" smtClean="0"/>
-              <a:t>27/02/2025</a:t>
+              <a:t>02/03/2025</a:t>
             </a:fld>
             <a:endParaRPr lang="it-IT"/>
           </a:p>
@@ -2668,7 +2668,7 @@
           <a:p>
             <a:fld id="{804FACE1-603D-405D-9BCD-7A01BF53AE91}" type="datetimeFigureOut">
               <a:rPr lang="it-IT" smtClean="0"/>
-              <a:t>27/02/2025</a:t>
+              <a:t>02/03/2025</a:t>
             </a:fld>
             <a:endParaRPr lang="it-IT"/>
           </a:p>
@@ -2909,7 +2909,7 @@
           <a:p>
             <a:fld id="{804FACE1-603D-405D-9BCD-7A01BF53AE91}" type="datetimeFigureOut">
               <a:rPr lang="it-IT" smtClean="0"/>
-              <a:t>27/02/2025</a:t>
+              <a:t>02/03/2025</a:t>
             </a:fld>
             <a:endParaRPr lang="it-IT"/>
           </a:p>
@@ -3340,7 +3340,7 @@
         </p:nvSpPr>
         <p:spPr>
           <a:xfrm>
-            <a:off x="2378759" y="131307"/>
+            <a:off x="596203" y="131307"/>
             <a:ext cx="3366198" cy="502418"/>
           </a:xfrm>
           <a:prstGeom prst="rect">
@@ -3400,7 +3400,7 @@
         <p:spPr>
           <a:xfrm>
             <a:off x="6447043" y="131307"/>
-            <a:ext cx="3366198" cy="502418"/>
+            <a:ext cx="4732234" cy="502418"/>
           </a:xfrm>
           <a:prstGeom prst="rect">
             <a:avLst/>
@@ -3460,22 +3460,22 @@
         </p:nvCxnSpPr>
         <p:spPr>
           <a:xfrm flipH="1">
-            <a:off x="6017342" y="0"/>
-            <a:ext cx="60344" cy="6938146"/>
+            <a:off x="4630615" y="5232"/>
+            <a:ext cx="22000" cy="6818354"/>
           </a:xfrm>
           <a:prstGeom prst="line">
             <a:avLst/>
           </a:prstGeom>
         </p:spPr>
         <p:style>
-          <a:lnRef idx="2">
-            <a:schemeClr val="accent1"/>
+          <a:lnRef idx="1">
+            <a:schemeClr val="accent6"/>
           </a:lnRef>
           <a:fillRef idx="0">
-            <a:schemeClr val="accent1"/>
+            <a:schemeClr val="accent6"/>
           </a:fillRef>
-          <a:effectRef idx="1">
-            <a:schemeClr val="accent1"/>
+          <a:effectRef idx="0">
+            <a:schemeClr val="accent6"/>
           </a:effectRef>
           <a:fontRef idx="minor">
             <a:schemeClr val="tx1"/>
@@ -3496,8 +3496,8 @@
         </p:nvSpPr>
         <p:spPr>
           <a:xfrm>
-            <a:off x="314632" y="3106994"/>
-            <a:ext cx="1415845" cy="502415"/>
+            <a:off x="213384" y="3061758"/>
+            <a:ext cx="1046488" cy="502415"/>
           </a:xfrm>
           <a:prstGeom prst="rect">
             <a:avLst/>
@@ -3540,48 +3540,6 @@
           </a:p>
         </p:txBody>
       </p:sp>
-      <p:cxnSp>
-        <p:nvCxnSpPr>
-          <p:cNvPr id="10" name="Connettore 2 9">
-            <a:extLst>
-              <a:ext uri="{FF2B5EF4-FFF2-40B4-BE49-F238E27FC236}">
-                <a16:creationId xmlns:a16="http://schemas.microsoft.com/office/drawing/2014/main" id="{341467A8-33CC-4E37-04D1-0976A327974E}"/>
-              </a:ext>
-            </a:extLst>
-          </p:cNvPr>
-          <p:cNvCxnSpPr>
-            <a:cxnSpLocks/>
-            <a:stCxn id="8" idx="3"/>
-          </p:cNvCxnSpPr>
-          <p:nvPr/>
-        </p:nvCxnSpPr>
-        <p:spPr>
-          <a:xfrm>
-            <a:off x="1730477" y="3358202"/>
-            <a:ext cx="481781" cy="0"/>
-          </a:xfrm>
-          <a:prstGeom prst="straightConnector1">
-            <a:avLst/>
-          </a:prstGeom>
-          <a:ln>
-            <a:tailEnd type="triangle"/>
-          </a:ln>
-        </p:spPr>
-        <p:style>
-          <a:lnRef idx="2">
-            <a:schemeClr val="accent1"/>
-          </a:lnRef>
-          <a:fillRef idx="0">
-            <a:schemeClr val="accent1"/>
-          </a:fillRef>
-          <a:effectRef idx="1">
-            <a:schemeClr val="accent1"/>
-          </a:effectRef>
-          <a:fontRef idx="minor">
-            <a:schemeClr val="tx1"/>
-          </a:fontRef>
-        </p:style>
-      </p:cxnSp>
       <p:sp>
         <p:nvSpPr>
           <p:cNvPr id="13" name="Rettangolo 12">
@@ -3596,8 +3554,8 @@
         </p:nvSpPr>
         <p:spPr>
           <a:xfrm>
-            <a:off x="2212258" y="3106994"/>
-            <a:ext cx="1415845" cy="502415"/>
+            <a:off x="2158600" y="2805135"/>
+            <a:ext cx="1415845" cy="1015662"/>
           </a:xfrm>
           <a:prstGeom prst="rect">
             <a:avLst/>
@@ -3635,7 +3593,7 @@
                   <a:schemeClr val="bg1"/>
                 </a:solidFill>
               </a:rPr>
-              <a:t>FACADE (+ DTO)</a:t>
+              <a:t>FACADE /SERVICE LAYER(+ DTO)</a:t>
             </a:r>
           </a:p>
         </p:txBody>
@@ -3654,7 +3612,7 @@
         </p:nvSpPr>
         <p:spPr>
           <a:xfrm>
-            <a:off x="2212259" y="3716594"/>
+            <a:off x="1992262" y="3924669"/>
             <a:ext cx="1838632" cy="1015663"/>
           </a:xfrm>
           <a:prstGeom prst="rect">
@@ -3687,54 +3645,12 @@
           </a:p>
         </p:txBody>
       </p:sp>
-      <p:cxnSp>
-        <p:nvCxnSpPr>
-          <p:cNvPr id="15" name="Connettore 2 14">
-            <a:extLst>
-              <a:ext uri="{FF2B5EF4-FFF2-40B4-BE49-F238E27FC236}">
-                <a16:creationId xmlns:a16="http://schemas.microsoft.com/office/drawing/2014/main" id="{AAB7BBE3-25E0-57E4-B949-98FBA22CDC5B}"/>
-              </a:ext>
-            </a:extLst>
-          </p:cNvPr>
-          <p:cNvCxnSpPr>
-            <a:cxnSpLocks/>
-            <a:endCxn id="16" idx="1"/>
-          </p:cNvCxnSpPr>
-          <p:nvPr/>
-        </p:nvCxnSpPr>
-        <p:spPr>
-          <a:xfrm>
-            <a:off x="3649604" y="3348853"/>
-            <a:ext cx="607763" cy="1"/>
-          </a:xfrm>
-          <a:prstGeom prst="straightConnector1">
-            <a:avLst/>
-          </a:prstGeom>
-          <a:ln>
-            <a:tailEnd type="triangle"/>
-          </a:ln>
-        </p:spPr>
-        <p:style>
-          <a:lnRef idx="2">
-            <a:schemeClr val="accent1"/>
-          </a:lnRef>
-          <a:fillRef idx="0">
-            <a:schemeClr val="accent1"/>
-          </a:fillRef>
-          <a:effectRef idx="1">
-            <a:schemeClr val="accent1"/>
-          </a:effectRef>
-          <a:fontRef idx="minor">
-            <a:schemeClr val="tx1"/>
-          </a:fontRef>
-        </p:style>
-      </p:cxnSp>
-      <p:sp>
-        <p:nvSpPr>
-          <p:cNvPr id="16" name="Rettangolo 15">
-            <a:extLst>
-              <a:ext uri="{FF2B5EF4-FFF2-40B4-BE49-F238E27FC236}">
-                <a16:creationId xmlns:a16="http://schemas.microsoft.com/office/drawing/2014/main" id="{9E833FBA-E7B5-BB14-331B-1251B5B7105D}"/>
+      <p:sp>
+        <p:nvSpPr>
+          <p:cNvPr id="19" name="Rettangolo 18">
+            <a:extLst>
+              <a:ext uri="{FF2B5EF4-FFF2-40B4-BE49-F238E27FC236}">
+                <a16:creationId xmlns:a16="http://schemas.microsoft.com/office/drawing/2014/main" id="{8A5E8818-03DA-2D1D-00FE-5660E1DC7465}"/>
               </a:ext>
             </a:extLst>
           </p:cNvPr>
@@ -3743,7 +3659,7 @@
         </p:nvSpPr>
         <p:spPr>
           <a:xfrm>
-            <a:off x="4257367" y="3097646"/>
+            <a:off x="4759524" y="3061758"/>
             <a:ext cx="1415845" cy="502415"/>
           </a:xfrm>
           <a:prstGeom prst="rect">
@@ -3782,60 +3698,17 @@
                   <a:schemeClr val="bg1"/>
                 </a:solidFill>
               </a:rPr>
-              <a:t>REMOTE PROXY</a:t>
-            </a:r>
-          </a:p>
-        </p:txBody>
-      </p:sp>
-      <p:cxnSp>
-        <p:nvCxnSpPr>
-          <p:cNvPr id="17" name="Connettore 2 16">
-            <a:extLst>
-              <a:ext uri="{FF2B5EF4-FFF2-40B4-BE49-F238E27FC236}">
-                <a16:creationId xmlns:a16="http://schemas.microsoft.com/office/drawing/2014/main" id="{47AA3C41-E6EE-D7CA-8032-8A134F421334}"/>
-              </a:ext>
-            </a:extLst>
-          </p:cNvPr>
-          <p:cNvCxnSpPr>
-            <a:cxnSpLocks/>
-            <a:stCxn id="16" idx="3"/>
-            <a:endCxn id="19" idx="1"/>
-          </p:cNvCxnSpPr>
-          <p:nvPr/>
-        </p:nvCxnSpPr>
-        <p:spPr>
-          <a:xfrm>
-            <a:off x="5673212" y="3348854"/>
-            <a:ext cx="816078" cy="0"/>
-          </a:xfrm>
-          <a:prstGeom prst="straightConnector1">
-            <a:avLst/>
-          </a:prstGeom>
-          <a:ln>
-            <a:tailEnd type="triangle"/>
-          </a:ln>
-        </p:spPr>
-        <p:style>
-          <a:lnRef idx="2">
-            <a:schemeClr val="accent1"/>
-          </a:lnRef>
-          <a:fillRef idx="0">
-            <a:schemeClr val="accent1"/>
-          </a:fillRef>
-          <a:effectRef idx="1">
-            <a:schemeClr val="accent1"/>
-          </a:effectRef>
-          <a:fontRef idx="minor">
-            <a:schemeClr val="tx1"/>
-          </a:fontRef>
-        </p:style>
-      </p:cxnSp>
-      <p:sp>
-        <p:nvSpPr>
-          <p:cNvPr id="19" name="Rettangolo 18">
-            <a:extLst>
-              <a:ext uri="{FF2B5EF4-FFF2-40B4-BE49-F238E27FC236}">
-                <a16:creationId xmlns:a16="http://schemas.microsoft.com/office/drawing/2014/main" id="{8A5E8818-03DA-2D1D-00FE-5660E1DC7465}"/>
+              <a:t>API GATEWAY</a:t>
+            </a:r>
+          </a:p>
+        </p:txBody>
+      </p:sp>
+      <p:sp>
+        <p:nvSpPr>
+          <p:cNvPr id="30" name="Rettangolo 29">
+            <a:extLst>
+              <a:ext uri="{FF2B5EF4-FFF2-40B4-BE49-F238E27FC236}">
+                <a16:creationId xmlns:a16="http://schemas.microsoft.com/office/drawing/2014/main" id="{B9FFB279-4D3E-D16D-151E-CAF72CD6CB94}"/>
               </a:ext>
             </a:extLst>
           </p:cNvPr>
@@ -3844,8 +3717,8 @@
         </p:nvSpPr>
         <p:spPr>
           <a:xfrm>
-            <a:off x="6489290" y="3097646"/>
-            <a:ext cx="1415845" cy="502415"/>
+            <a:off x="7597341" y="841937"/>
+            <a:ext cx="1365227" cy="1142225"/>
           </a:xfrm>
           <a:prstGeom prst="rect">
             <a:avLst/>
@@ -3878,63 +3751,22 @@
           <a:p>
             <a:pPr algn="ctr"/>
             <a:r>
-              <a:rPr lang="it-IT" dirty="0">
+              <a:rPr lang="it-IT" sz="1200" dirty="0">
                 <a:solidFill>
                   <a:schemeClr val="bg1"/>
                 </a:solidFill>
               </a:rPr>
-              <a:t>API GATEWAY</a:t>
-            </a:r>
-          </a:p>
-        </p:txBody>
-      </p:sp>
-      <p:cxnSp>
-        <p:nvCxnSpPr>
-          <p:cNvPr id="20" name="Connettore 2 19">
-            <a:extLst>
-              <a:ext uri="{FF2B5EF4-FFF2-40B4-BE49-F238E27FC236}">
-                <a16:creationId xmlns:a16="http://schemas.microsoft.com/office/drawing/2014/main" id="{BEDD79BB-5260-8472-64A3-094A1D5BDCD5}"/>
-              </a:ext>
-            </a:extLst>
-          </p:cNvPr>
-          <p:cNvCxnSpPr>
-            <a:cxnSpLocks/>
-          </p:cNvCxnSpPr>
-          <p:nvPr/>
-        </p:nvCxnSpPr>
-        <p:spPr>
-          <a:xfrm>
-            <a:off x="7905135" y="3358201"/>
-            <a:ext cx="481781" cy="0"/>
-          </a:xfrm>
-          <a:prstGeom prst="straightConnector1">
-            <a:avLst/>
-          </a:prstGeom>
-          <a:ln>
-            <a:tailEnd type="triangle"/>
-          </a:ln>
-        </p:spPr>
-        <p:style>
-          <a:lnRef idx="2">
-            <a:schemeClr val="accent1"/>
-          </a:lnRef>
-          <a:fillRef idx="0">
-            <a:schemeClr val="accent1"/>
-          </a:fillRef>
-          <a:effectRef idx="1">
-            <a:schemeClr val="accent1"/>
-          </a:effectRef>
-          <a:fontRef idx="minor">
-            <a:schemeClr val="tx1"/>
-          </a:fontRef>
-        </p:style>
-      </p:cxnSp>
-      <p:sp>
-        <p:nvSpPr>
-          <p:cNvPr id="21" name="Rettangolo 20">
-            <a:extLst>
-              <a:ext uri="{FF2B5EF4-FFF2-40B4-BE49-F238E27FC236}">
-                <a16:creationId xmlns:a16="http://schemas.microsoft.com/office/drawing/2014/main" id="{B35DF2E5-DCDB-6B96-A811-64DC1EE31B18}"/>
+              <a:t>ACCOUNT SERVICE (AUTHENTICATOR + TOKEN + RBAC)</a:t>
+            </a:r>
+          </a:p>
+        </p:txBody>
+      </p:sp>
+      <p:sp>
+        <p:nvSpPr>
+          <p:cNvPr id="31" name="Rettangolo 30">
+            <a:extLst>
+              <a:ext uri="{FF2B5EF4-FFF2-40B4-BE49-F238E27FC236}">
+                <a16:creationId xmlns:a16="http://schemas.microsoft.com/office/drawing/2014/main" id="{94B5E196-998F-119A-9F6D-C40FD751FE75}"/>
               </a:ext>
             </a:extLst>
           </p:cNvPr>
@@ -3943,8 +3775,8 @@
         </p:nvSpPr>
         <p:spPr>
           <a:xfrm>
-            <a:off x="8368548" y="2941787"/>
-            <a:ext cx="1415845" cy="774807"/>
+            <a:off x="10391241" y="1120283"/>
+            <a:ext cx="1031039" cy="585534"/>
           </a:xfrm>
           <a:prstGeom prst="rect">
             <a:avLst/>
@@ -3977,22 +3809,22 @@
           <a:p>
             <a:pPr algn="ctr"/>
             <a:r>
-              <a:rPr lang="it-IT" dirty="0">
+              <a:rPr lang="it-IT" sz="1200" dirty="0">
                 <a:solidFill>
                   <a:schemeClr val="bg1"/>
                 </a:solidFill>
               </a:rPr>
-              <a:t>REMOTE FACADE (+ DTO)</a:t>
-            </a:r>
-          </a:p>
-        </p:txBody>
-      </p:sp>
-      <p:sp>
-        <p:nvSpPr>
-          <p:cNvPr id="30" name="Rettangolo 29">
-            <a:extLst>
-              <a:ext uri="{FF2B5EF4-FFF2-40B4-BE49-F238E27FC236}">
-                <a16:creationId xmlns:a16="http://schemas.microsoft.com/office/drawing/2014/main" id="{B9FFB279-4D3E-D16D-151E-CAF72CD6CB94}"/>
+              <a:t>PROFILE SERVICE</a:t>
+            </a:r>
+          </a:p>
+        </p:txBody>
+      </p:sp>
+      <p:sp>
+        <p:nvSpPr>
+          <p:cNvPr id="32" name="Rettangolo 31">
+            <a:extLst>
+              <a:ext uri="{FF2B5EF4-FFF2-40B4-BE49-F238E27FC236}">
+                <a16:creationId xmlns:a16="http://schemas.microsoft.com/office/drawing/2014/main" id="{AD6B099B-59F4-ED3B-ABD3-6D3D1E4BCB1F}"/>
               </a:ext>
             </a:extLst>
           </p:cNvPr>
@@ -4001,8 +3833,8 @@
         </p:nvSpPr>
         <p:spPr>
           <a:xfrm>
-            <a:off x="10127226" y="1082947"/>
-            <a:ext cx="2064773" cy="1552098"/>
+            <a:off x="11191184" y="2136533"/>
+            <a:ext cx="894736" cy="585534"/>
           </a:xfrm>
           <a:prstGeom prst="rect">
             <a:avLst/>
@@ -4035,22 +3867,22 @@
           <a:p>
             <a:pPr algn="ctr"/>
             <a:r>
-              <a:rPr lang="it-IT" dirty="0">
+              <a:rPr lang="it-IT" sz="1200" dirty="0">
                 <a:solidFill>
                   <a:schemeClr val="bg1"/>
                 </a:solidFill>
               </a:rPr>
-              <a:t>ACCOUNT SERVICE (AUTHENTICATOR + TOKEN + RBAC)</a:t>
-            </a:r>
-          </a:p>
-        </p:txBody>
-      </p:sp>
-      <p:sp>
-        <p:nvSpPr>
-          <p:cNvPr id="31" name="Rettangolo 30">
-            <a:extLst>
-              <a:ext uri="{FF2B5EF4-FFF2-40B4-BE49-F238E27FC236}">
-                <a16:creationId xmlns:a16="http://schemas.microsoft.com/office/drawing/2014/main" id="{94B5E196-998F-119A-9F6D-C40FD751FE75}"/>
+              <a:t>PRODUCT SERVICE</a:t>
+            </a:r>
+          </a:p>
+        </p:txBody>
+      </p:sp>
+      <p:sp>
+        <p:nvSpPr>
+          <p:cNvPr id="33" name="Rettangolo 32">
+            <a:extLst>
+              <a:ext uri="{FF2B5EF4-FFF2-40B4-BE49-F238E27FC236}">
+                <a16:creationId xmlns:a16="http://schemas.microsoft.com/office/drawing/2014/main" id="{F1A2D1C0-1D5E-46E5-14AA-B2806C820473}"/>
               </a:ext>
             </a:extLst>
           </p:cNvPr>
@@ -4059,8 +3891,8 @@
         </p:nvSpPr>
         <p:spPr>
           <a:xfrm>
-            <a:off x="10137058" y="2983864"/>
-            <a:ext cx="2054941" cy="502415"/>
+            <a:off x="11026493" y="3997200"/>
+            <a:ext cx="816078" cy="529405"/>
           </a:xfrm>
           <a:prstGeom prst="rect">
             <a:avLst/>
@@ -4093,22 +3925,22 @@
           <a:p>
             <a:pPr algn="ctr"/>
             <a:r>
-              <a:rPr lang="it-IT" dirty="0">
+              <a:rPr lang="it-IT" sz="1200" dirty="0">
                 <a:solidFill>
                   <a:schemeClr val="bg1"/>
                 </a:solidFill>
               </a:rPr>
-              <a:t>PROFILE SERVICE</a:t>
-            </a:r>
-          </a:p>
-        </p:txBody>
-      </p:sp>
-      <p:sp>
-        <p:nvSpPr>
-          <p:cNvPr id="32" name="Rettangolo 31">
-            <a:extLst>
-              <a:ext uri="{FF2B5EF4-FFF2-40B4-BE49-F238E27FC236}">
-                <a16:creationId xmlns:a16="http://schemas.microsoft.com/office/drawing/2014/main" id="{AD6B099B-59F4-ED3B-ABD3-6D3D1E4BCB1F}"/>
+              <a:t>CART SERVICE</a:t>
+            </a:r>
+          </a:p>
+        </p:txBody>
+      </p:sp>
+      <p:sp>
+        <p:nvSpPr>
+          <p:cNvPr id="34" name="Rettangolo 33">
+            <a:extLst>
+              <a:ext uri="{FF2B5EF4-FFF2-40B4-BE49-F238E27FC236}">
+                <a16:creationId xmlns:a16="http://schemas.microsoft.com/office/drawing/2014/main" id="{9E0936B3-D3D2-9E03-BFEF-4470B138910A}"/>
               </a:ext>
             </a:extLst>
           </p:cNvPr>
@@ -4117,8 +3949,8 @@
         </p:nvSpPr>
         <p:spPr>
           <a:xfrm>
-            <a:off x="10127226" y="3971748"/>
-            <a:ext cx="2054941" cy="502415"/>
+            <a:off x="9503739" y="4659814"/>
+            <a:ext cx="887502" cy="529404"/>
           </a:xfrm>
           <a:prstGeom prst="rect">
             <a:avLst/>
@@ -4151,22 +3983,22 @@
           <a:p>
             <a:pPr algn="ctr"/>
             <a:r>
-              <a:rPr lang="it-IT" dirty="0">
+              <a:rPr lang="it-IT" sz="1200" dirty="0">
                 <a:solidFill>
                   <a:schemeClr val="bg1"/>
                 </a:solidFill>
               </a:rPr>
-              <a:t>PRODUCT SERVICE</a:t>
-            </a:r>
-          </a:p>
-        </p:txBody>
-      </p:sp>
-      <p:sp>
-        <p:nvSpPr>
-          <p:cNvPr id="33" name="Rettangolo 32">
-            <a:extLst>
-              <a:ext uri="{FF2B5EF4-FFF2-40B4-BE49-F238E27FC236}">
-                <a16:creationId xmlns:a16="http://schemas.microsoft.com/office/drawing/2014/main" id="{F1A2D1C0-1D5E-46E5-14AA-B2806C820473}"/>
+              <a:t>ORDER SERVICE</a:t>
+            </a:r>
+          </a:p>
+        </p:txBody>
+      </p:sp>
+      <p:sp>
+        <p:nvSpPr>
+          <p:cNvPr id="49" name="Parentesi graffa chiusa 48">
+            <a:extLst>
+              <a:ext uri="{FF2B5EF4-FFF2-40B4-BE49-F238E27FC236}">
+                <a16:creationId xmlns:a16="http://schemas.microsoft.com/office/drawing/2014/main" id="{E690162B-CEA9-B64C-84E7-75574F847358}"/>
               </a:ext>
             </a:extLst>
           </p:cNvPr>
@@ -4174,9 +4006,88 @@
           <p:nvPr/>
         </p:nvSpPr>
         <p:spPr>
+          <a:xfrm rot="5400000">
+            <a:off x="9116673" y="3195215"/>
+            <a:ext cx="725320" cy="5213172"/>
+          </a:xfrm>
+          <a:prstGeom prst="rightBrace">
+            <a:avLst/>
+          </a:prstGeom>
+        </p:spPr>
+        <p:style>
+          <a:lnRef idx="2">
+            <a:schemeClr val="accent1"/>
+          </a:lnRef>
+          <a:fillRef idx="0">
+            <a:schemeClr val="accent1"/>
+          </a:fillRef>
+          <a:effectRef idx="1">
+            <a:schemeClr val="accent1"/>
+          </a:effectRef>
+          <a:fontRef idx="minor">
+            <a:schemeClr val="tx1"/>
+          </a:fontRef>
+        </p:style>
+        <p:txBody>
+          <a:bodyPr rtlCol="0" anchor="ctr"/>
+          <a:lstStyle/>
+          <a:p>
+            <a:pPr algn="ctr"/>
+            <a:endParaRPr lang="it-IT"/>
+          </a:p>
+        </p:txBody>
+      </p:sp>
+      <p:sp>
+        <p:nvSpPr>
+          <p:cNvPr id="50" name="CasellaDiTesto 49">
+            <a:extLst>
+              <a:ext uri="{FF2B5EF4-FFF2-40B4-BE49-F238E27FC236}">
+                <a16:creationId xmlns:a16="http://schemas.microsoft.com/office/drawing/2014/main" id="{824BFB08-5610-AFFB-499F-E1ED57F386E1}"/>
+              </a:ext>
+            </a:extLst>
+          </p:cNvPr>
+          <p:cNvSpPr txBox="1"/>
+          <p:nvPr/>
+        </p:nvSpPr>
+        <p:spPr>
           <a:xfrm>
-            <a:off x="10137059" y="4959632"/>
-            <a:ext cx="2054941" cy="502415"/>
+            <a:off x="8683276" y="6164096"/>
+            <a:ext cx="1838632" cy="323165"/>
+          </a:xfrm>
+          <a:prstGeom prst="rect">
+            <a:avLst/>
+          </a:prstGeom>
+          <a:noFill/>
+        </p:spPr>
+        <p:txBody>
+          <a:bodyPr wrap="square" rtlCol="0">
+            <a:spAutoFit/>
+          </a:bodyPr>
+          <a:lstStyle/>
+          <a:p>
+            <a:r>
+              <a:rPr lang="it-IT" sz="1500" dirty="0"/>
+              <a:t>DB PER SERVICE</a:t>
+            </a:r>
+          </a:p>
+        </p:txBody>
+      </p:sp>
+      <p:sp>
+        <p:nvSpPr>
+          <p:cNvPr id="41" name="Rettangolo 40">
+            <a:extLst>
+              <a:ext uri="{FF2B5EF4-FFF2-40B4-BE49-F238E27FC236}">
+                <a16:creationId xmlns:a16="http://schemas.microsoft.com/office/drawing/2014/main" id="{DF39EF88-9F7D-86EA-F4BE-E0A31D3712D7}"/>
+              </a:ext>
+            </a:extLst>
+          </p:cNvPr>
+          <p:cNvSpPr/>
+          <p:nvPr/>
+        </p:nvSpPr>
+        <p:spPr>
+          <a:xfrm>
+            <a:off x="7209869" y="4526605"/>
+            <a:ext cx="1082835" cy="725319"/>
           </a:xfrm>
           <a:prstGeom prst="rect">
             <a:avLst/>
@@ -4209,98 +4120,42 @@
           <a:p>
             <a:pPr algn="ctr"/>
             <a:r>
-              <a:rPr lang="it-IT" dirty="0">
+              <a:rPr lang="it-IT" sz="1200" dirty="0">
                 <a:solidFill>
                   <a:schemeClr val="bg1"/>
                 </a:solidFill>
               </a:rPr>
-              <a:t>CART SERVICE</a:t>
-            </a:r>
-          </a:p>
-        </p:txBody>
-      </p:sp>
-      <p:sp>
-        <p:nvSpPr>
-          <p:cNvPr id="34" name="Rettangolo 33">
-            <a:extLst>
-              <a:ext uri="{FF2B5EF4-FFF2-40B4-BE49-F238E27FC236}">
-                <a16:creationId xmlns:a16="http://schemas.microsoft.com/office/drawing/2014/main" id="{9E0936B3-D3D2-9E03-BFEF-4470B138910A}"/>
-              </a:ext>
-            </a:extLst>
-          </p:cNvPr>
-          <p:cNvSpPr/>
-          <p:nvPr/>
-        </p:nvSpPr>
-        <p:spPr>
-          <a:xfrm>
-            <a:off x="10137057" y="5973067"/>
-            <a:ext cx="2054941" cy="502415"/>
-          </a:xfrm>
-          <a:prstGeom prst="rect">
-            <a:avLst/>
-          </a:prstGeom>
-          <a:solidFill>
-            <a:schemeClr val="accent1">
-              <a:lumMod val="75000"/>
-            </a:schemeClr>
-          </a:solidFill>
-        </p:spPr>
-        <p:style>
-          <a:lnRef idx="2">
-            <a:schemeClr val="accent1">
-              <a:shade val="15000"/>
-            </a:schemeClr>
-          </a:lnRef>
-          <a:fillRef idx="1">
-            <a:schemeClr val="accent1"/>
-          </a:fillRef>
-          <a:effectRef idx="0">
-            <a:schemeClr val="accent1"/>
-          </a:effectRef>
-          <a:fontRef idx="minor">
-            <a:schemeClr val="lt1"/>
-          </a:fontRef>
-        </p:style>
-        <p:txBody>
-          <a:bodyPr rtlCol="0" anchor="ctr"/>
-          <a:lstStyle/>
-          <a:p>
-            <a:pPr algn="ctr"/>
-            <a:r>
-              <a:rPr lang="it-IT" dirty="0">
-                <a:solidFill>
-                  <a:schemeClr val="bg1"/>
-                </a:solidFill>
-              </a:rPr>
-              <a:t>ORDER SERVICE</a:t>
+              <a:t>CREDITCARD SERVICE</a:t>
             </a:r>
           </a:p>
         </p:txBody>
       </p:sp>
       <p:cxnSp>
         <p:nvCxnSpPr>
-          <p:cNvPr id="35" name="Connettore 2 34">
-            <a:extLst>
-              <a:ext uri="{FF2B5EF4-FFF2-40B4-BE49-F238E27FC236}">
-                <a16:creationId xmlns:a16="http://schemas.microsoft.com/office/drawing/2014/main" id="{F7C191F0-FE5B-20E0-822B-AA4CFC9DE7A8}"/>
+          <p:cNvPr id="62" name="Connettore 2 61">
+            <a:extLst>
+              <a:ext uri="{FF2B5EF4-FFF2-40B4-BE49-F238E27FC236}">
+                <a16:creationId xmlns:a16="http://schemas.microsoft.com/office/drawing/2014/main" id="{380B18F1-3A28-FFD2-5F4D-C35312E30C25}"/>
               </a:ext>
             </a:extLst>
           </p:cNvPr>
           <p:cNvCxnSpPr>
             <a:cxnSpLocks/>
-            <a:endCxn id="31" idx="1"/>
+            <a:stCxn id="8" idx="3"/>
+            <a:endCxn id="13" idx="1"/>
           </p:cNvCxnSpPr>
           <p:nvPr/>
         </p:nvCxnSpPr>
         <p:spPr>
           <a:xfrm>
-            <a:off x="9784393" y="3235071"/>
-            <a:ext cx="352665" cy="1"/>
+            <a:off x="1259872" y="3312966"/>
+            <a:ext cx="898728" cy="0"/>
           </a:xfrm>
           <a:prstGeom prst="straightConnector1">
             <a:avLst/>
           </a:prstGeom>
           <a:ln>
+            <a:headEnd type="triangle"/>
             <a:tailEnd type="triangle"/>
           </a:ln>
         </p:spPr>
@@ -4321,29 +4176,156 @@
       </p:cxnSp>
       <p:cxnSp>
         <p:nvCxnSpPr>
-          <p:cNvPr id="37" name="Connettore 2 36">
-            <a:extLst>
-              <a:ext uri="{FF2B5EF4-FFF2-40B4-BE49-F238E27FC236}">
-                <a16:creationId xmlns:a16="http://schemas.microsoft.com/office/drawing/2014/main" id="{8438AAA8-DA4F-9694-F30D-192596C9A6DA}"/>
+          <p:cNvPr id="63" name="Connettore 2 62">
+            <a:extLst>
+              <a:ext uri="{FF2B5EF4-FFF2-40B4-BE49-F238E27FC236}">
+                <a16:creationId xmlns:a16="http://schemas.microsoft.com/office/drawing/2014/main" id="{22AA39EF-5C05-D832-F0F2-FA33E4351CBC}"/>
               </a:ext>
             </a:extLst>
           </p:cNvPr>
           <p:cNvCxnSpPr>
             <a:cxnSpLocks/>
-            <a:stCxn id="21" idx="3"/>
-            <a:endCxn id="30" idx="1"/>
+            <a:stCxn id="13" idx="3"/>
+            <a:endCxn id="19" idx="1"/>
           </p:cNvCxnSpPr>
           <p:nvPr/>
         </p:nvCxnSpPr>
         <p:spPr>
-          <a:xfrm flipV="1">
-            <a:off x="9784393" y="1858996"/>
-            <a:ext cx="342833" cy="1470195"/>
+          <a:xfrm>
+            <a:off x="3574445" y="3312966"/>
+            <a:ext cx="1185079" cy="0"/>
           </a:xfrm>
           <a:prstGeom prst="straightConnector1">
             <a:avLst/>
           </a:prstGeom>
           <a:ln>
+            <a:headEnd type="triangle"/>
+            <a:tailEnd type="triangle"/>
+          </a:ln>
+        </p:spPr>
+        <p:style>
+          <a:lnRef idx="2">
+            <a:schemeClr val="accent1"/>
+          </a:lnRef>
+          <a:fillRef idx="0">
+            <a:schemeClr val="accent1"/>
+          </a:fillRef>
+          <a:effectRef idx="1">
+            <a:schemeClr val="accent1"/>
+          </a:effectRef>
+          <a:fontRef idx="minor">
+            <a:schemeClr val="tx1"/>
+          </a:fontRef>
+        </p:style>
+      </p:cxnSp>
+      <p:sp>
+        <p:nvSpPr>
+          <p:cNvPr id="71" name="CasellaDiTesto 70">
+            <a:extLst>
+              <a:ext uri="{FF2B5EF4-FFF2-40B4-BE49-F238E27FC236}">
+                <a16:creationId xmlns:a16="http://schemas.microsoft.com/office/drawing/2014/main" id="{52143E1C-E629-C43A-049B-C7B49982AD4F}"/>
+              </a:ext>
+            </a:extLst>
+          </p:cNvPr>
+          <p:cNvSpPr txBox="1"/>
+          <p:nvPr/>
+        </p:nvSpPr>
+        <p:spPr>
+          <a:xfrm>
+            <a:off x="4806166" y="1806053"/>
+            <a:ext cx="1640877" cy="1246495"/>
+          </a:xfrm>
+          <a:prstGeom prst="rect">
+            <a:avLst/>
+          </a:prstGeom>
+          <a:noFill/>
+        </p:spPr>
+        <p:txBody>
+          <a:bodyPr wrap="square" rtlCol="0">
+            <a:spAutoFit/>
+          </a:bodyPr>
+          <a:lstStyle/>
+          <a:p>
+            <a:r>
+              <a:rPr lang="it-IT" sz="1500" dirty="0"/>
+              <a:t>ASSEMBLER </a:t>
+            </a:r>
+          </a:p>
+          <a:p>
+            <a:r>
+              <a:rPr lang="it-IT" sz="1500" dirty="0"/>
+              <a:t>DI RICHIESTE/</a:t>
+            </a:r>
+          </a:p>
+          <a:p>
+            <a:r>
+              <a:rPr lang="it-IT" sz="1500" dirty="0"/>
+              <a:t>RISPOSTE SEMPLIFICATE (DTO)</a:t>
+            </a:r>
+          </a:p>
+        </p:txBody>
+      </p:sp>
+      <p:sp>
+        <p:nvSpPr>
+          <p:cNvPr id="72" name="CasellaDiTesto 71">
+            <a:extLst>
+              <a:ext uri="{FF2B5EF4-FFF2-40B4-BE49-F238E27FC236}">
+                <a16:creationId xmlns:a16="http://schemas.microsoft.com/office/drawing/2014/main" id="{E0BB9481-2BC6-00D8-35F9-4155E020DABF}"/>
+              </a:ext>
+            </a:extLst>
+          </p:cNvPr>
+          <p:cNvSpPr txBox="1"/>
+          <p:nvPr/>
+        </p:nvSpPr>
+        <p:spPr>
+          <a:xfrm>
+            <a:off x="4806166" y="3647782"/>
+            <a:ext cx="1909296" cy="323165"/>
+          </a:xfrm>
+          <a:prstGeom prst="rect">
+            <a:avLst/>
+          </a:prstGeom>
+          <a:noFill/>
+        </p:spPr>
+        <p:txBody>
+          <a:bodyPr wrap="square" rtlCol="0">
+            <a:spAutoFit/>
+          </a:bodyPr>
+          <a:lstStyle/>
+          <a:p>
+            <a:r>
+              <a:rPr lang="it-IT" sz="1500" dirty="0"/>
+              <a:t>RATE LIMITER</a:t>
+            </a:r>
+          </a:p>
+        </p:txBody>
+      </p:sp>
+      <p:cxnSp>
+        <p:nvCxnSpPr>
+          <p:cNvPr id="73" name="Connettore 2 72">
+            <a:extLst>
+              <a:ext uri="{FF2B5EF4-FFF2-40B4-BE49-F238E27FC236}">
+                <a16:creationId xmlns:a16="http://schemas.microsoft.com/office/drawing/2014/main" id="{2FAC88F9-3BAA-9EA9-E72C-72DFDF497F9B}"/>
+              </a:ext>
+            </a:extLst>
+          </p:cNvPr>
+          <p:cNvCxnSpPr>
+            <a:cxnSpLocks/>
+            <a:stCxn id="30" idx="3"/>
+            <a:endCxn id="31" idx="1"/>
+          </p:cNvCxnSpPr>
+          <p:nvPr/>
+        </p:nvCxnSpPr>
+        <p:spPr>
+          <a:xfrm>
+            <a:off x="8962568" y="1413050"/>
+            <a:ext cx="1428673" cy="0"/>
+          </a:xfrm>
+          <a:prstGeom prst="straightConnector1">
+            <a:avLst/>
+          </a:prstGeom>
+          <a:ln>
+            <a:headEnd type="triangle"/>
             <a:tailEnd type="triangle"/>
           </a:ln>
         </p:spPr>
@@ -4364,28 +4346,30 @@
       </p:cxnSp>
       <p:cxnSp>
         <p:nvCxnSpPr>
-          <p:cNvPr id="40" name="Connettore 2 39">
-            <a:extLst>
-              <a:ext uri="{FF2B5EF4-FFF2-40B4-BE49-F238E27FC236}">
-                <a16:creationId xmlns:a16="http://schemas.microsoft.com/office/drawing/2014/main" id="{56D8C85A-1CAC-1567-EAB6-2B8FA9D9BB8B}"/>
+          <p:cNvPr id="75" name="Connettore 2 74">
+            <a:extLst>
+              <a:ext uri="{FF2B5EF4-FFF2-40B4-BE49-F238E27FC236}">
+                <a16:creationId xmlns:a16="http://schemas.microsoft.com/office/drawing/2014/main" id="{46111910-55A5-1BED-5946-CE8DDF1F3D0D}"/>
               </a:ext>
             </a:extLst>
           </p:cNvPr>
           <p:cNvCxnSpPr>
             <a:cxnSpLocks/>
-            <a:endCxn id="32" idx="1"/>
+            <a:stCxn id="19" idx="3"/>
+            <a:endCxn id="31" idx="1"/>
           </p:cNvCxnSpPr>
           <p:nvPr/>
         </p:nvCxnSpPr>
         <p:spPr>
-          <a:xfrm>
-            <a:off x="9813241" y="3235556"/>
-            <a:ext cx="313985" cy="987400"/>
+          <a:xfrm flipV="1">
+            <a:off x="6175369" y="1413050"/>
+            <a:ext cx="4215872" cy="1899916"/>
           </a:xfrm>
           <a:prstGeom prst="straightConnector1">
             <a:avLst/>
           </a:prstGeom>
           <a:ln>
+            <a:headEnd type="triangle"/>
             <a:tailEnd type="triangle"/>
           </a:ln>
         </p:spPr>
@@ -4406,28 +4390,30 @@
       </p:cxnSp>
       <p:cxnSp>
         <p:nvCxnSpPr>
-          <p:cNvPr id="42" name="Connettore 2 41">
-            <a:extLst>
-              <a:ext uri="{FF2B5EF4-FFF2-40B4-BE49-F238E27FC236}">
-                <a16:creationId xmlns:a16="http://schemas.microsoft.com/office/drawing/2014/main" id="{B45AEA1A-8E8D-03B2-F0EF-FB50427203F4}"/>
+          <p:cNvPr id="77" name="Connettore 2 76">
+            <a:extLst>
+              <a:ext uri="{FF2B5EF4-FFF2-40B4-BE49-F238E27FC236}">
+                <a16:creationId xmlns:a16="http://schemas.microsoft.com/office/drawing/2014/main" id="{1A039900-7A9A-46CF-068D-771F07B6BDF2}"/>
               </a:ext>
             </a:extLst>
           </p:cNvPr>
           <p:cNvCxnSpPr>
             <a:cxnSpLocks/>
-            <a:endCxn id="33" idx="1"/>
+            <a:stCxn id="19" idx="3"/>
+            <a:endCxn id="32" idx="1"/>
           </p:cNvCxnSpPr>
           <p:nvPr/>
         </p:nvCxnSpPr>
         <p:spPr>
-          <a:xfrm>
-            <a:off x="9794225" y="3244273"/>
-            <a:ext cx="342834" cy="1966567"/>
+          <a:xfrm flipV="1">
+            <a:off x="6175369" y="2429300"/>
+            <a:ext cx="5015815" cy="883666"/>
           </a:xfrm>
           <a:prstGeom prst="straightConnector1">
             <a:avLst/>
           </a:prstGeom>
           <a:ln>
+            <a:headEnd type="triangle"/>
             <a:tailEnd type="triangle"/>
           </a:ln>
         </p:spPr>
@@ -4448,29 +4434,30 @@
       </p:cxnSp>
       <p:cxnSp>
         <p:nvCxnSpPr>
-          <p:cNvPr id="46" name="Connettore 2 45">
-            <a:extLst>
-              <a:ext uri="{FF2B5EF4-FFF2-40B4-BE49-F238E27FC236}">
-                <a16:creationId xmlns:a16="http://schemas.microsoft.com/office/drawing/2014/main" id="{9BCA4B1D-8F87-C8EC-A0B4-7649A312C14E}"/>
+          <p:cNvPr id="80" name="Connettore 2 79">
+            <a:extLst>
+              <a:ext uri="{FF2B5EF4-FFF2-40B4-BE49-F238E27FC236}">
+                <a16:creationId xmlns:a16="http://schemas.microsoft.com/office/drawing/2014/main" id="{C69B4ECB-7FE0-4934-EA0A-96B5AD71E017}"/>
               </a:ext>
             </a:extLst>
           </p:cNvPr>
           <p:cNvCxnSpPr>
             <a:cxnSpLocks/>
-            <a:stCxn id="21" idx="3"/>
-            <a:endCxn id="34" idx="1"/>
+            <a:stCxn id="19" idx="3"/>
+            <a:endCxn id="33" idx="0"/>
           </p:cNvCxnSpPr>
           <p:nvPr/>
         </p:nvCxnSpPr>
         <p:spPr>
           <a:xfrm>
-            <a:off x="9784393" y="3329191"/>
-            <a:ext cx="352664" cy="2895084"/>
+            <a:off x="6175369" y="3312966"/>
+            <a:ext cx="5259163" cy="684234"/>
           </a:xfrm>
           <a:prstGeom prst="straightConnector1">
             <a:avLst/>
           </a:prstGeom>
           <a:ln>
+            <a:headEnd type="triangle"/>
             <a:tailEnd type="triangle"/>
           </a:ln>
         </p:spPr>
@@ -4489,26 +4476,34 @@
           </a:fontRef>
         </p:style>
       </p:cxnSp>
-      <p:sp>
-        <p:nvSpPr>
-          <p:cNvPr id="49" name="Parentesi graffa chiusa 48">
-            <a:extLst>
-              <a:ext uri="{FF2B5EF4-FFF2-40B4-BE49-F238E27FC236}">
-                <a16:creationId xmlns:a16="http://schemas.microsoft.com/office/drawing/2014/main" id="{E690162B-CEA9-B64C-84E7-75574F847358}"/>
-              </a:ext>
-            </a:extLst>
-          </p:cNvPr>
-          <p:cNvSpPr/>
+      <p:cxnSp>
+        <p:nvCxnSpPr>
+          <p:cNvPr id="83" name="Connettore 2 82">
+            <a:extLst>
+              <a:ext uri="{FF2B5EF4-FFF2-40B4-BE49-F238E27FC236}">
+                <a16:creationId xmlns:a16="http://schemas.microsoft.com/office/drawing/2014/main" id="{7457F9E3-18B0-49B8-E1A3-2C43804BF837}"/>
+              </a:ext>
+            </a:extLst>
+          </p:cNvPr>
+          <p:cNvCxnSpPr>
+            <a:cxnSpLocks/>
+            <a:stCxn id="19" idx="3"/>
+            <a:endCxn id="34" idx="0"/>
+          </p:cNvCxnSpPr>
           <p:nvPr/>
-        </p:nvSpPr>
-        <p:spPr>
-          <a:xfrm rot="16200000">
-            <a:off x="10948788" y="-230488"/>
-            <a:ext cx="431478" cy="1858297"/>
-          </a:xfrm>
-          <a:prstGeom prst="rightBrace">
+        </p:nvCxnSpPr>
+        <p:spPr>
+          <a:xfrm>
+            <a:off x="6175369" y="3312966"/>
+            <a:ext cx="3772121" cy="1346848"/>
+          </a:xfrm>
+          <a:prstGeom prst="straightConnector1">
             <a:avLst/>
           </a:prstGeom>
+          <a:ln>
+            <a:headEnd type="triangle"/>
+            <a:tailEnd type="triangle"/>
+          </a:ln>
         </p:spPr>
         <p:style>
           <a:lnRef idx="2">
@@ -4524,50 +4519,359 @@
             <a:schemeClr val="tx1"/>
           </a:fontRef>
         </p:style>
-        <p:txBody>
-          <a:bodyPr rtlCol="0" anchor="ctr"/>
-          <a:lstStyle/>
-          <a:p>
-            <a:pPr algn="ctr"/>
-            <a:endParaRPr lang="it-IT"/>
-          </a:p>
-        </p:txBody>
-      </p:sp>
-      <p:sp>
-        <p:nvSpPr>
-          <p:cNvPr id="50" name="CasellaDiTesto 49">
-            <a:extLst>
-              <a:ext uri="{FF2B5EF4-FFF2-40B4-BE49-F238E27FC236}">
-                <a16:creationId xmlns:a16="http://schemas.microsoft.com/office/drawing/2014/main" id="{824BFB08-5610-AFFB-499F-E1ED57F386E1}"/>
-              </a:ext>
-            </a:extLst>
-          </p:cNvPr>
-          <p:cNvSpPr txBox="1"/>
+      </p:cxnSp>
+      <p:cxnSp>
+        <p:nvCxnSpPr>
+          <p:cNvPr id="86" name="Connettore 2 85">
+            <a:extLst>
+              <a:ext uri="{FF2B5EF4-FFF2-40B4-BE49-F238E27FC236}">
+                <a16:creationId xmlns:a16="http://schemas.microsoft.com/office/drawing/2014/main" id="{4C5FB970-B24A-333B-D6C7-864446B617C6}"/>
+              </a:ext>
+            </a:extLst>
+          </p:cNvPr>
+          <p:cNvCxnSpPr>
+            <a:cxnSpLocks/>
+            <a:stCxn id="19" idx="3"/>
+            <a:endCxn id="41" idx="0"/>
+          </p:cNvCxnSpPr>
           <p:nvPr/>
-        </p:nvSpPr>
+        </p:nvCxnSpPr>
         <p:spPr>
           <a:xfrm>
-            <a:off x="10364551" y="159756"/>
-            <a:ext cx="1838632" cy="323165"/>
-          </a:xfrm>
-          <a:prstGeom prst="rect">
+            <a:off x="6175369" y="3312966"/>
+            <a:ext cx="1575918" cy="1213639"/>
+          </a:xfrm>
+          <a:prstGeom prst="straightConnector1">
             <a:avLst/>
           </a:prstGeom>
-          <a:noFill/>
-        </p:spPr>
-        <p:txBody>
-          <a:bodyPr wrap="square" rtlCol="0">
-            <a:spAutoFit/>
-          </a:bodyPr>
-          <a:lstStyle/>
-          <a:p>
-            <a:r>
-              <a:rPr lang="it-IT" sz="1500" dirty="0"/>
-              <a:t>DB PER SERVICE</a:t>
-            </a:r>
-          </a:p>
-        </p:txBody>
-      </p:sp>
+          <a:ln>
+            <a:headEnd type="triangle"/>
+            <a:tailEnd type="triangle"/>
+          </a:ln>
+        </p:spPr>
+        <p:style>
+          <a:lnRef idx="2">
+            <a:schemeClr val="accent1"/>
+          </a:lnRef>
+          <a:fillRef idx="0">
+            <a:schemeClr val="accent1"/>
+          </a:fillRef>
+          <a:effectRef idx="1">
+            <a:schemeClr val="accent1"/>
+          </a:effectRef>
+          <a:fontRef idx="minor">
+            <a:schemeClr val="tx1"/>
+          </a:fontRef>
+        </p:style>
+      </p:cxnSp>
+      <p:cxnSp>
+        <p:nvCxnSpPr>
+          <p:cNvPr id="114" name="Connettore 2 113">
+            <a:extLst>
+              <a:ext uri="{FF2B5EF4-FFF2-40B4-BE49-F238E27FC236}">
+                <a16:creationId xmlns:a16="http://schemas.microsoft.com/office/drawing/2014/main" id="{CD08305C-F0EE-95BA-71F5-8CD2FCA36579}"/>
+              </a:ext>
+            </a:extLst>
+          </p:cNvPr>
+          <p:cNvCxnSpPr>
+            <a:cxnSpLocks/>
+            <a:stCxn id="19" idx="3"/>
+            <a:endCxn id="30" idx="1"/>
+          </p:cNvCxnSpPr>
+          <p:nvPr/>
+        </p:nvCxnSpPr>
+        <p:spPr>
+          <a:xfrm flipV="1">
+            <a:off x="6175369" y="1413050"/>
+            <a:ext cx="1421972" cy="1899916"/>
+          </a:xfrm>
+          <a:prstGeom prst="straightConnector1">
+            <a:avLst/>
+          </a:prstGeom>
+          <a:ln>
+            <a:headEnd type="triangle"/>
+            <a:tailEnd type="triangle"/>
+          </a:ln>
+        </p:spPr>
+        <p:style>
+          <a:lnRef idx="2">
+            <a:schemeClr val="accent1"/>
+          </a:lnRef>
+          <a:fillRef idx="0">
+            <a:schemeClr val="accent1"/>
+          </a:fillRef>
+          <a:effectRef idx="1">
+            <a:schemeClr val="accent1"/>
+          </a:effectRef>
+          <a:fontRef idx="minor">
+            <a:schemeClr val="tx1"/>
+          </a:fontRef>
+        </p:style>
+      </p:cxnSp>
+      <p:cxnSp>
+        <p:nvCxnSpPr>
+          <p:cNvPr id="117" name="Connettore 2 116">
+            <a:extLst>
+              <a:ext uri="{FF2B5EF4-FFF2-40B4-BE49-F238E27FC236}">
+                <a16:creationId xmlns:a16="http://schemas.microsoft.com/office/drawing/2014/main" id="{DFA7B5EE-203F-EFF0-742E-9467426D3F86}"/>
+              </a:ext>
+            </a:extLst>
+          </p:cNvPr>
+          <p:cNvCxnSpPr>
+            <a:cxnSpLocks/>
+            <a:stCxn id="41" idx="0"/>
+            <a:endCxn id="31" idx="1"/>
+          </p:cNvCxnSpPr>
+          <p:nvPr/>
+        </p:nvCxnSpPr>
+        <p:spPr>
+          <a:xfrm flipV="1">
+            <a:off x="7751287" y="1413050"/>
+            <a:ext cx="2639954" cy="3113555"/>
+          </a:xfrm>
+          <a:prstGeom prst="straightConnector1">
+            <a:avLst/>
+          </a:prstGeom>
+          <a:ln>
+            <a:headEnd type="triangle"/>
+            <a:tailEnd type="triangle"/>
+          </a:ln>
+        </p:spPr>
+        <p:style>
+          <a:lnRef idx="2">
+            <a:schemeClr val="accent1"/>
+          </a:lnRef>
+          <a:fillRef idx="0">
+            <a:schemeClr val="accent1"/>
+          </a:fillRef>
+          <a:effectRef idx="1">
+            <a:schemeClr val="accent1"/>
+          </a:effectRef>
+          <a:fontRef idx="minor">
+            <a:schemeClr val="tx1"/>
+          </a:fontRef>
+        </p:style>
+      </p:cxnSp>
+      <p:cxnSp>
+        <p:nvCxnSpPr>
+          <p:cNvPr id="121" name="Connettore 2 120">
+            <a:extLst>
+              <a:ext uri="{FF2B5EF4-FFF2-40B4-BE49-F238E27FC236}">
+                <a16:creationId xmlns:a16="http://schemas.microsoft.com/office/drawing/2014/main" id="{4F85AAEA-6C5F-C9E4-FA68-FF541D61513F}"/>
+              </a:ext>
+            </a:extLst>
+          </p:cNvPr>
+          <p:cNvCxnSpPr>
+            <a:cxnSpLocks/>
+            <a:stCxn id="34" idx="0"/>
+            <a:endCxn id="31" idx="1"/>
+          </p:cNvCxnSpPr>
+          <p:nvPr/>
+        </p:nvCxnSpPr>
+        <p:spPr>
+          <a:xfrm flipV="1">
+            <a:off x="9947490" y="1413050"/>
+            <a:ext cx="443751" cy="3246764"/>
+          </a:xfrm>
+          <a:prstGeom prst="straightConnector1">
+            <a:avLst/>
+          </a:prstGeom>
+          <a:ln>
+            <a:headEnd type="triangle"/>
+            <a:tailEnd type="triangle"/>
+          </a:ln>
+        </p:spPr>
+        <p:style>
+          <a:lnRef idx="2">
+            <a:schemeClr val="accent1"/>
+          </a:lnRef>
+          <a:fillRef idx="0">
+            <a:schemeClr val="accent1"/>
+          </a:fillRef>
+          <a:effectRef idx="1">
+            <a:schemeClr val="accent1"/>
+          </a:effectRef>
+          <a:fontRef idx="minor">
+            <a:schemeClr val="tx1"/>
+          </a:fontRef>
+        </p:style>
+      </p:cxnSp>
+      <p:cxnSp>
+        <p:nvCxnSpPr>
+          <p:cNvPr id="125" name="Connettore 2 124">
+            <a:extLst>
+              <a:ext uri="{FF2B5EF4-FFF2-40B4-BE49-F238E27FC236}">
+                <a16:creationId xmlns:a16="http://schemas.microsoft.com/office/drawing/2014/main" id="{7A62706D-F866-39C7-32F5-57AD5CF42EC7}"/>
+              </a:ext>
+            </a:extLst>
+          </p:cNvPr>
+          <p:cNvCxnSpPr>
+            <a:cxnSpLocks/>
+            <a:stCxn id="33" idx="0"/>
+            <a:endCxn id="31" idx="2"/>
+          </p:cNvCxnSpPr>
+          <p:nvPr/>
+        </p:nvCxnSpPr>
+        <p:spPr>
+          <a:xfrm flipH="1" flipV="1">
+            <a:off x="10906761" y="1705817"/>
+            <a:ext cx="527771" cy="2291383"/>
+          </a:xfrm>
+          <a:prstGeom prst="straightConnector1">
+            <a:avLst/>
+          </a:prstGeom>
+          <a:ln>
+            <a:headEnd type="triangle"/>
+            <a:tailEnd type="triangle"/>
+          </a:ln>
+        </p:spPr>
+        <p:style>
+          <a:lnRef idx="2">
+            <a:schemeClr val="accent1"/>
+          </a:lnRef>
+          <a:fillRef idx="0">
+            <a:schemeClr val="accent1"/>
+          </a:fillRef>
+          <a:effectRef idx="1">
+            <a:schemeClr val="accent1"/>
+          </a:effectRef>
+          <a:fontRef idx="minor">
+            <a:schemeClr val="tx1"/>
+          </a:fontRef>
+        </p:style>
+      </p:cxnSp>
+      <p:cxnSp>
+        <p:nvCxnSpPr>
+          <p:cNvPr id="139" name="Connettore 2 138">
+            <a:extLst>
+              <a:ext uri="{FF2B5EF4-FFF2-40B4-BE49-F238E27FC236}">
+                <a16:creationId xmlns:a16="http://schemas.microsoft.com/office/drawing/2014/main" id="{873F71EF-AF1D-2318-B3F6-F50226C985AF}"/>
+              </a:ext>
+            </a:extLst>
+          </p:cNvPr>
+          <p:cNvCxnSpPr>
+            <a:cxnSpLocks/>
+            <a:stCxn id="33" idx="0"/>
+            <a:endCxn id="32" idx="2"/>
+          </p:cNvCxnSpPr>
+          <p:nvPr/>
+        </p:nvCxnSpPr>
+        <p:spPr>
+          <a:xfrm flipV="1">
+            <a:off x="11434532" y="2722067"/>
+            <a:ext cx="204020" cy="1275133"/>
+          </a:xfrm>
+          <a:prstGeom prst="straightConnector1">
+            <a:avLst/>
+          </a:prstGeom>
+          <a:ln>
+            <a:headEnd type="triangle"/>
+            <a:tailEnd type="triangle"/>
+          </a:ln>
+        </p:spPr>
+        <p:style>
+          <a:lnRef idx="2">
+            <a:schemeClr val="accent1"/>
+          </a:lnRef>
+          <a:fillRef idx="0">
+            <a:schemeClr val="accent1"/>
+          </a:fillRef>
+          <a:effectRef idx="1">
+            <a:schemeClr val="accent1"/>
+          </a:effectRef>
+          <a:fontRef idx="minor">
+            <a:schemeClr val="tx1"/>
+          </a:fontRef>
+        </p:style>
+      </p:cxnSp>
+      <p:cxnSp>
+        <p:nvCxnSpPr>
+          <p:cNvPr id="142" name="Connettore 2 141">
+            <a:extLst>
+              <a:ext uri="{FF2B5EF4-FFF2-40B4-BE49-F238E27FC236}">
+                <a16:creationId xmlns:a16="http://schemas.microsoft.com/office/drawing/2014/main" id="{E16ECAFF-9404-D24B-2BFA-4117E52DF37E}"/>
+              </a:ext>
+            </a:extLst>
+          </p:cNvPr>
+          <p:cNvCxnSpPr>
+            <a:cxnSpLocks/>
+            <a:stCxn id="34" idx="3"/>
+            <a:endCxn id="33" idx="1"/>
+          </p:cNvCxnSpPr>
+          <p:nvPr/>
+        </p:nvCxnSpPr>
+        <p:spPr>
+          <a:xfrm flipV="1">
+            <a:off x="10391241" y="4261903"/>
+            <a:ext cx="635252" cy="662613"/>
+          </a:xfrm>
+          <a:prstGeom prst="straightConnector1">
+            <a:avLst/>
+          </a:prstGeom>
+          <a:ln>
+            <a:headEnd type="triangle"/>
+            <a:tailEnd type="triangle"/>
+          </a:ln>
+        </p:spPr>
+        <p:style>
+          <a:lnRef idx="2">
+            <a:schemeClr val="accent1"/>
+          </a:lnRef>
+          <a:fillRef idx="0">
+            <a:schemeClr val="accent1"/>
+          </a:fillRef>
+          <a:effectRef idx="1">
+            <a:schemeClr val="accent1"/>
+          </a:effectRef>
+          <a:fontRef idx="minor">
+            <a:schemeClr val="tx1"/>
+          </a:fontRef>
+        </p:style>
+      </p:cxnSp>
+      <p:cxnSp>
+        <p:nvCxnSpPr>
+          <p:cNvPr id="145" name="Connettore 2 144">
+            <a:extLst>
+              <a:ext uri="{FF2B5EF4-FFF2-40B4-BE49-F238E27FC236}">
+                <a16:creationId xmlns:a16="http://schemas.microsoft.com/office/drawing/2014/main" id="{39D77460-6BC8-A37C-07A6-9E5ADAE9F749}"/>
+              </a:ext>
+            </a:extLst>
+          </p:cNvPr>
+          <p:cNvCxnSpPr>
+            <a:cxnSpLocks/>
+            <a:stCxn id="41" idx="3"/>
+            <a:endCxn id="34" idx="1"/>
+          </p:cNvCxnSpPr>
+          <p:nvPr/>
+        </p:nvCxnSpPr>
+        <p:spPr>
+          <a:xfrm>
+            <a:off x="8292704" y="4889265"/>
+            <a:ext cx="1211035" cy="35251"/>
+          </a:xfrm>
+          <a:prstGeom prst="straightConnector1">
+            <a:avLst/>
+          </a:prstGeom>
+          <a:ln>
+            <a:headEnd type="triangle"/>
+            <a:tailEnd type="triangle"/>
+          </a:ln>
+        </p:spPr>
+        <p:style>
+          <a:lnRef idx="2">
+            <a:schemeClr val="accent1"/>
+          </a:lnRef>
+          <a:fillRef idx="0">
+            <a:schemeClr val="accent1"/>
+          </a:fillRef>
+          <a:effectRef idx="1">
+            <a:schemeClr val="accent1"/>
+          </a:effectRef>
+          <a:fontRef idx="minor">
+            <a:schemeClr val="tx1"/>
+          </a:fontRef>
+        </p:style>
+      </p:cxnSp>
     </p:spTree>
     <p:extLst>
       <p:ext uri="{BB962C8B-B14F-4D97-AF65-F5344CB8AC3E}">

</xml_diff>

<commit_message>
FIXED all in 3 microservices
</commit_message>
<xml_diff>
--- a/Design draft.pptx
+++ b/Design draft.pptx
@@ -259,7 +259,7 @@
           <a:p>
             <a:fld id="{804FACE1-603D-405D-9BCD-7A01BF53AE91}" type="datetimeFigureOut">
               <a:rPr lang="it-IT" smtClean="0"/>
-              <a:t>02/03/2025</a:t>
+              <a:t>20/03/2025</a:t>
             </a:fld>
             <a:endParaRPr lang="it-IT"/>
           </a:p>
@@ -457,7 +457,7 @@
           <a:p>
             <a:fld id="{804FACE1-603D-405D-9BCD-7A01BF53AE91}" type="datetimeFigureOut">
               <a:rPr lang="it-IT" smtClean="0"/>
-              <a:t>02/03/2025</a:t>
+              <a:t>20/03/2025</a:t>
             </a:fld>
             <a:endParaRPr lang="it-IT"/>
           </a:p>
@@ -665,7 +665,7 @@
           <a:p>
             <a:fld id="{804FACE1-603D-405D-9BCD-7A01BF53AE91}" type="datetimeFigureOut">
               <a:rPr lang="it-IT" smtClean="0"/>
-              <a:t>02/03/2025</a:t>
+              <a:t>20/03/2025</a:t>
             </a:fld>
             <a:endParaRPr lang="it-IT"/>
           </a:p>
@@ -863,7 +863,7 @@
           <a:p>
             <a:fld id="{804FACE1-603D-405D-9BCD-7A01BF53AE91}" type="datetimeFigureOut">
               <a:rPr lang="it-IT" smtClean="0"/>
-              <a:t>02/03/2025</a:t>
+              <a:t>20/03/2025</a:t>
             </a:fld>
             <a:endParaRPr lang="it-IT"/>
           </a:p>
@@ -1138,7 +1138,7 @@
           <a:p>
             <a:fld id="{804FACE1-603D-405D-9BCD-7A01BF53AE91}" type="datetimeFigureOut">
               <a:rPr lang="it-IT" smtClean="0"/>
-              <a:t>02/03/2025</a:t>
+              <a:t>20/03/2025</a:t>
             </a:fld>
             <a:endParaRPr lang="it-IT"/>
           </a:p>
@@ -1403,7 +1403,7 @@
           <a:p>
             <a:fld id="{804FACE1-603D-405D-9BCD-7A01BF53AE91}" type="datetimeFigureOut">
               <a:rPr lang="it-IT" smtClean="0"/>
-              <a:t>02/03/2025</a:t>
+              <a:t>20/03/2025</a:t>
             </a:fld>
             <a:endParaRPr lang="it-IT"/>
           </a:p>
@@ -1815,7 +1815,7 @@
           <a:p>
             <a:fld id="{804FACE1-603D-405D-9BCD-7A01BF53AE91}" type="datetimeFigureOut">
               <a:rPr lang="it-IT" smtClean="0"/>
-              <a:t>02/03/2025</a:t>
+              <a:t>20/03/2025</a:t>
             </a:fld>
             <a:endParaRPr lang="it-IT"/>
           </a:p>
@@ -1956,7 +1956,7 @@
           <a:p>
             <a:fld id="{804FACE1-603D-405D-9BCD-7A01BF53AE91}" type="datetimeFigureOut">
               <a:rPr lang="it-IT" smtClean="0"/>
-              <a:t>02/03/2025</a:t>
+              <a:t>20/03/2025</a:t>
             </a:fld>
             <a:endParaRPr lang="it-IT"/>
           </a:p>
@@ -2069,7 +2069,7 @@
           <a:p>
             <a:fld id="{804FACE1-603D-405D-9BCD-7A01BF53AE91}" type="datetimeFigureOut">
               <a:rPr lang="it-IT" smtClean="0"/>
-              <a:t>02/03/2025</a:t>
+              <a:t>20/03/2025</a:t>
             </a:fld>
             <a:endParaRPr lang="it-IT"/>
           </a:p>
@@ -2380,7 +2380,7 @@
           <a:p>
             <a:fld id="{804FACE1-603D-405D-9BCD-7A01BF53AE91}" type="datetimeFigureOut">
               <a:rPr lang="it-IT" smtClean="0"/>
-              <a:t>02/03/2025</a:t>
+              <a:t>20/03/2025</a:t>
             </a:fld>
             <a:endParaRPr lang="it-IT"/>
           </a:p>
@@ -2668,7 +2668,7 @@
           <a:p>
             <a:fld id="{804FACE1-603D-405D-9BCD-7A01BF53AE91}" type="datetimeFigureOut">
               <a:rPr lang="it-IT" smtClean="0"/>
-              <a:t>02/03/2025</a:t>
+              <a:t>20/03/2025</a:t>
             </a:fld>
             <a:endParaRPr lang="it-IT"/>
           </a:p>
@@ -2909,7 +2909,7 @@
           <a:p>
             <a:fld id="{804FACE1-603D-405D-9BCD-7A01BF53AE91}" type="datetimeFigureOut">
               <a:rPr lang="it-IT" smtClean="0"/>
-              <a:t>02/03/2025</a:t>
+              <a:t>20/03/2025</a:t>
             </a:fld>
             <a:endParaRPr lang="it-IT"/>
           </a:p>
@@ -3717,7 +3717,7 @@
         </p:nvSpPr>
         <p:spPr>
           <a:xfrm>
-            <a:off x="7597341" y="841937"/>
+            <a:off x="8130546" y="841937"/>
             <a:ext cx="1365227" cy="1142225"/>
           </a:xfrm>
           <a:prstGeom prst="rect">
@@ -3763,10 +3763,10 @@
       </p:sp>
       <p:sp>
         <p:nvSpPr>
-          <p:cNvPr id="31" name="Rettangolo 30">
-            <a:extLst>
-              <a:ext uri="{FF2B5EF4-FFF2-40B4-BE49-F238E27FC236}">
-                <a16:creationId xmlns:a16="http://schemas.microsoft.com/office/drawing/2014/main" id="{94B5E196-998F-119A-9F6D-C40FD751FE75}"/>
+          <p:cNvPr id="33" name="Rettangolo 32">
+            <a:extLst>
+              <a:ext uri="{FF2B5EF4-FFF2-40B4-BE49-F238E27FC236}">
+                <a16:creationId xmlns:a16="http://schemas.microsoft.com/office/drawing/2014/main" id="{F1A2D1C0-1D5E-46E5-14AA-B2806C820473}"/>
               </a:ext>
             </a:extLst>
           </p:cNvPr>
@@ -3775,8 +3775,8 @@
         </p:nvSpPr>
         <p:spPr>
           <a:xfrm>
-            <a:off x="10391241" y="1120283"/>
-            <a:ext cx="1031039" cy="585534"/>
+            <a:off x="10521908" y="2986332"/>
+            <a:ext cx="1427211" cy="725320"/>
           </a:xfrm>
           <a:prstGeom prst="rect">
             <a:avLst/>
@@ -3809,123 +3809,7 @@
           <a:p>
             <a:pPr algn="ctr"/>
             <a:r>
-              <a:rPr lang="it-IT" sz="1200" dirty="0">
-                <a:solidFill>
-                  <a:schemeClr val="bg1"/>
-                </a:solidFill>
-              </a:rPr>
-              <a:t>PROFILE SERVICE</a:t>
-            </a:r>
-          </a:p>
-        </p:txBody>
-      </p:sp>
-      <p:sp>
-        <p:nvSpPr>
-          <p:cNvPr id="32" name="Rettangolo 31">
-            <a:extLst>
-              <a:ext uri="{FF2B5EF4-FFF2-40B4-BE49-F238E27FC236}">
-                <a16:creationId xmlns:a16="http://schemas.microsoft.com/office/drawing/2014/main" id="{AD6B099B-59F4-ED3B-ABD3-6D3D1E4BCB1F}"/>
-              </a:ext>
-            </a:extLst>
-          </p:cNvPr>
-          <p:cNvSpPr/>
-          <p:nvPr/>
-        </p:nvSpPr>
-        <p:spPr>
-          <a:xfrm>
-            <a:off x="11191184" y="2136533"/>
-            <a:ext cx="894736" cy="585534"/>
-          </a:xfrm>
-          <a:prstGeom prst="rect">
-            <a:avLst/>
-          </a:prstGeom>
-          <a:solidFill>
-            <a:schemeClr val="accent1">
-              <a:lumMod val="75000"/>
-            </a:schemeClr>
-          </a:solidFill>
-        </p:spPr>
-        <p:style>
-          <a:lnRef idx="2">
-            <a:schemeClr val="accent1">
-              <a:shade val="15000"/>
-            </a:schemeClr>
-          </a:lnRef>
-          <a:fillRef idx="1">
-            <a:schemeClr val="accent1"/>
-          </a:fillRef>
-          <a:effectRef idx="0">
-            <a:schemeClr val="accent1"/>
-          </a:effectRef>
-          <a:fontRef idx="minor">
-            <a:schemeClr val="lt1"/>
-          </a:fontRef>
-        </p:style>
-        <p:txBody>
-          <a:bodyPr rtlCol="0" anchor="ctr"/>
-          <a:lstStyle/>
-          <a:p>
-            <a:pPr algn="ctr"/>
-            <a:r>
-              <a:rPr lang="it-IT" sz="1200" dirty="0">
-                <a:solidFill>
-                  <a:schemeClr val="bg1"/>
-                </a:solidFill>
-              </a:rPr>
-              <a:t>PRODUCT SERVICE</a:t>
-            </a:r>
-          </a:p>
-        </p:txBody>
-      </p:sp>
-      <p:sp>
-        <p:nvSpPr>
-          <p:cNvPr id="33" name="Rettangolo 32">
-            <a:extLst>
-              <a:ext uri="{FF2B5EF4-FFF2-40B4-BE49-F238E27FC236}">
-                <a16:creationId xmlns:a16="http://schemas.microsoft.com/office/drawing/2014/main" id="{F1A2D1C0-1D5E-46E5-14AA-B2806C820473}"/>
-              </a:ext>
-            </a:extLst>
-          </p:cNvPr>
-          <p:cNvSpPr/>
-          <p:nvPr/>
-        </p:nvSpPr>
-        <p:spPr>
-          <a:xfrm>
-            <a:off x="11026493" y="3997200"/>
-            <a:ext cx="816078" cy="529405"/>
-          </a:xfrm>
-          <a:prstGeom prst="rect">
-            <a:avLst/>
-          </a:prstGeom>
-          <a:solidFill>
-            <a:schemeClr val="accent1">
-              <a:lumMod val="75000"/>
-            </a:schemeClr>
-          </a:solidFill>
-        </p:spPr>
-        <p:style>
-          <a:lnRef idx="2">
-            <a:schemeClr val="accent1">
-              <a:shade val="15000"/>
-            </a:schemeClr>
-          </a:lnRef>
-          <a:fillRef idx="1">
-            <a:schemeClr val="accent1"/>
-          </a:fillRef>
-          <a:effectRef idx="0">
-            <a:schemeClr val="accent1"/>
-          </a:effectRef>
-          <a:fontRef idx="minor">
-            <a:schemeClr val="lt1"/>
-          </a:fontRef>
-        </p:style>
-        <p:txBody>
-          <a:bodyPr rtlCol="0" anchor="ctr"/>
-          <a:lstStyle/>
-          <a:p>
-            <a:pPr algn="ctr"/>
-            <a:r>
-              <a:rPr lang="it-IT" sz="1200" dirty="0">
+              <a:rPr lang="it-IT" sz="1500" dirty="0">
                 <a:solidFill>
                   <a:schemeClr val="bg1"/>
                 </a:solidFill>
@@ -3937,10 +3821,10 @@
       </p:sp>
       <p:sp>
         <p:nvSpPr>
-          <p:cNvPr id="34" name="Rettangolo 33">
-            <a:extLst>
-              <a:ext uri="{FF2B5EF4-FFF2-40B4-BE49-F238E27FC236}">
-                <a16:creationId xmlns:a16="http://schemas.microsoft.com/office/drawing/2014/main" id="{9E0936B3-D3D2-9E03-BFEF-4470B138910A}"/>
+          <p:cNvPr id="49" name="Parentesi graffa chiusa 48">
+            <a:extLst>
+              <a:ext uri="{FF2B5EF4-FFF2-40B4-BE49-F238E27FC236}">
+                <a16:creationId xmlns:a16="http://schemas.microsoft.com/office/drawing/2014/main" id="{E690162B-CEA9-B64C-84E7-75574F847358}"/>
               </a:ext>
             </a:extLst>
           </p:cNvPr>
@@ -3948,67 +3832,9 @@
           <p:nvPr/>
         </p:nvSpPr>
         <p:spPr>
-          <a:xfrm>
-            <a:off x="9503739" y="4659814"/>
-            <a:ext cx="887502" cy="529404"/>
-          </a:xfrm>
-          <a:prstGeom prst="rect">
-            <a:avLst/>
-          </a:prstGeom>
-          <a:solidFill>
-            <a:schemeClr val="accent1">
-              <a:lumMod val="75000"/>
-            </a:schemeClr>
-          </a:solidFill>
-        </p:spPr>
-        <p:style>
-          <a:lnRef idx="2">
-            <a:schemeClr val="accent1">
-              <a:shade val="15000"/>
-            </a:schemeClr>
-          </a:lnRef>
-          <a:fillRef idx="1">
-            <a:schemeClr val="accent1"/>
-          </a:fillRef>
-          <a:effectRef idx="0">
-            <a:schemeClr val="accent1"/>
-          </a:effectRef>
-          <a:fontRef idx="minor">
-            <a:schemeClr val="lt1"/>
-          </a:fontRef>
-        </p:style>
-        <p:txBody>
-          <a:bodyPr rtlCol="0" anchor="ctr"/>
-          <a:lstStyle/>
-          <a:p>
-            <a:pPr algn="ctr"/>
-            <a:r>
-              <a:rPr lang="it-IT" sz="1200" dirty="0">
-                <a:solidFill>
-                  <a:schemeClr val="bg1"/>
-                </a:solidFill>
-              </a:rPr>
-              <a:t>ORDER SERVICE</a:t>
-            </a:r>
-          </a:p>
-        </p:txBody>
-      </p:sp>
-      <p:sp>
-        <p:nvSpPr>
-          <p:cNvPr id="49" name="Parentesi graffa chiusa 48">
-            <a:extLst>
-              <a:ext uri="{FF2B5EF4-FFF2-40B4-BE49-F238E27FC236}">
-                <a16:creationId xmlns:a16="http://schemas.microsoft.com/office/drawing/2014/main" id="{E690162B-CEA9-B64C-84E7-75574F847358}"/>
-              </a:ext>
-            </a:extLst>
-          </p:cNvPr>
-          <p:cNvSpPr/>
-          <p:nvPr/>
-        </p:nvSpPr>
-        <p:spPr>
           <a:xfrm rot="5400000">
-            <a:off x="9116673" y="3195215"/>
-            <a:ext cx="725320" cy="5213172"/>
+            <a:off x="9105428" y="3288933"/>
+            <a:ext cx="725320" cy="4744048"/>
           </a:xfrm>
           <a:prstGeom prst="rightBrace">
             <a:avLst/>
@@ -4051,7 +3877,7 @@
         </p:nvSpPr>
         <p:spPr>
           <a:xfrm>
-            <a:off x="8683276" y="6164096"/>
+            <a:off x="8683276" y="6058640"/>
             <a:ext cx="1838632" cy="323165"/>
           </a:xfrm>
           <a:prstGeom prst="rect">
@@ -4086,7 +3912,7 @@
         </p:nvSpPr>
         <p:spPr>
           <a:xfrm>
-            <a:off x="7209869" y="4526605"/>
+            <a:off x="8271741" y="4523589"/>
             <a:ext cx="1082835" cy="725319"/>
           </a:xfrm>
           <a:prstGeom prst="rect">
@@ -4312,102 +4138,14 @@
           <p:cNvCxnSpPr>
             <a:cxnSpLocks/>
             <a:stCxn id="30" idx="3"/>
-            <a:endCxn id="31" idx="1"/>
+            <a:endCxn id="33" idx="0"/>
           </p:cNvCxnSpPr>
           <p:nvPr/>
         </p:nvCxnSpPr>
         <p:spPr>
           <a:xfrm>
-            <a:off x="8962568" y="1413050"/>
-            <a:ext cx="1428673" cy="0"/>
-          </a:xfrm>
-          <a:prstGeom prst="straightConnector1">
-            <a:avLst/>
-          </a:prstGeom>
-          <a:ln>
-            <a:headEnd type="triangle"/>
-            <a:tailEnd type="triangle"/>
-          </a:ln>
-        </p:spPr>
-        <p:style>
-          <a:lnRef idx="2">
-            <a:schemeClr val="accent1"/>
-          </a:lnRef>
-          <a:fillRef idx="0">
-            <a:schemeClr val="accent1"/>
-          </a:fillRef>
-          <a:effectRef idx="1">
-            <a:schemeClr val="accent1"/>
-          </a:effectRef>
-          <a:fontRef idx="minor">
-            <a:schemeClr val="tx1"/>
-          </a:fontRef>
-        </p:style>
-      </p:cxnSp>
-      <p:cxnSp>
-        <p:nvCxnSpPr>
-          <p:cNvPr id="75" name="Connettore 2 74">
-            <a:extLst>
-              <a:ext uri="{FF2B5EF4-FFF2-40B4-BE49-F238E27FC236}">
-                <a16:creationId xmlns:a16="http://schemas.microsoft.com/office/drawing/2014/main" id="{46111910-55A5-1BED-5946-CE8DDF1F3D0D}"/>
-              </a:ext>
-            </a:extLst>
-          </p:cNvPr>
-          <p:cNvCxnSpPr>
-            <a:cxnSpLocks/>
-            <a:stCxn id="19" idx="3"/>
-            <a:endCxn id="31" idx="1"/>
-          </p:cNvCxnSpPr>
-          <p:nvPr/>
-        </p:nvCxnSpPr>
-        <p:spPr>
-          <a:xfrm flipV="1">
-            <a:off x="6175369" y="1413050"/>
-            <a:ext cx="4215872" cy="1899916"/>
-          </a:xfrm>
-          <a:prstGeom prst="straightConnector1">
-            <a:avLst/>
-          </a:prstGeom>
-          <a:ln>
-            <a:headEnd type="triangle"/>
-            <a:tailEnd type="triangle"/>
-          </a:ln>
-        </p:spPr>
-        <p:style>
-          <a:lnRef idx="2">
-            <a:schemeClr val="accent1"/>
-          </a:lnRef>
-          <a:fillRef idx="0">
-            <a:schemeClr val="accent1"/>
-          </a:fillRef>
-          <a:effectRef idx="1">
-            <a:schemeClr val="accent1"/>
-          </a:effectRef>
-          <a:fontRef idx="minor">
-            <a:schemeClr val="tx1"/>
-          </a:fontRef>
-        </p:style>
-      </p:cxnSp>
-      <p:cxnSp>
-        <p:nvCxnSpPr>
-          <p:cNvPr id="77" name="Connettore 2 76">
-            <a:extLst>
-              <a:ext uri="{FF2B5EF4-FFF2-40B4-BE49-F238E27FC236}">
-                <a16:creationId xmlns:a16="http://schemas.microsoft.com/office/drawing/2014/main" id="{1A039900-7A9A-46CF-068D-771F07B6BDF2}"/>
-              </a:ext>
-            </a:extLst>
-          </p:cNvPr>
-          <p:cNvCxnSpPr>
-            <a:cxnSpLocks/>
-            <a:stCxn id="19" idx="3"/>
-            <a:endCxn id="32" idx="1"/>
-          </p:cNvCxnSpPr>
-          <p:nvPr/>
-        </p:nvCxnSpPr>
-        <p:spPr>
-          <a:xfrm flipV="1">
-            <a:off x="6175369" y="2429300"/>
-            <a:ext cx="5015815" cy="883666"/>
+            <a:off x="9495773" y="1413050"/>
+            <a:ext cx="1739741" cy="1573282"/>
           </a:xfrm>
           <a:prstGeom prst="straightConnector1">
             <a:avLst/>
@@ -4444,58 +4182,14 @@
           <p:cNvCxnSpPr>
             <a:cxnSpLocks/>
             <a:stCxn id="19" idx="3"/>
-            <a:endCxn id="33" idx="0"/>
+            <a:endCxn id="33" idx="1"/>
           </p:cNvCxnSpPr>
           <p:nvPr/>
         </p:nvCxnSpPr>
         <p:spPr>
           <a:xfrm>
             <a:off x="6175369" y="3312966"/>
-            <a:ext cx="5259163" cy="684234"/>
-          </a:xfrm>
-          <a:prstGeom prst="straightConnector1">
-            <a:avLst/>
-          </a:prstGeom>
-          <a:ln>
-            <a:headEnd type="triangle"/>
-            <a:tailEnd type="triangle"/>
-          </a:ln>
-        </p:spPr>
-        <p:style>
-          <a:lnRef idx="2">
-            <a:schemeClr val="accent1"/>
-          </a:lnRef>
-          <a:fillRef idx="0">
-            <a:schemeClr val="accent1"/>
-          </a:fillRef>
-          <a:effectRef idx="1">
-            <a:schemeClr val="accent1"/>
-          </a:effectRef>
-          <a:fontRef idx="minor">
-            <a:schemeClr val="tx1"/>
-          </a:fontRef>
-        </p:style>
-      </p:cxnSp>
-      <p:cxnSp>
-        <p:nvCxnSpPr>
-          <p:cNvPr id="83" name="Connettore 2 82">
-            <a:extLst>
-              <a:ext uri="{FF2B5EF4-FFF2-40B4-BE49-F238E27FC236}">
-                <a16:creationId xmlns:a16="http://schemas.microsoft.com/office/drawing/2014/main" id="{7457F9E3-18B0-49B8-E1A3-2C43804BF837}"/>
-              </a:ext>
-            </a:extLst>
-          </p:cNvPr>
-          <p:cNvCxnSpPr>
-            <a:cxnSpLocks/>
-            <a:stCxn id="19" idx="3"/>
-            <a:endCxn id="34" idx="0"/>
-          </p:cNvCxnSpPr>
-          <p:nvPr/>
-        </p:nvCxnSpPr>
-        <p:spPr>
-          <a:xfrm>
-            <a:off x="6175369" y="3312966"/>
-            <a:ext cx="3772121" cy="1346848"/>
+            <a:ext cx="4346539" cy="36026"/>
           </a:xfrm>
           <a:prstGeom prst="straightConnector1">
             <a:avLst/>
@@ -4532,14 +4226,14 @@
           <p:cNvCxnSpPr>
             <a:cxnSpLocks/>
             <a:stCxn id="19" idx="3"/>
-            <a:endCxn id="41" idx="0"/>
+            <a:endCxn id="41" idx="1"/>
           </p:cNvCxnSpPr>
           <p:nvPr/>
         </p:nvCxnSpPr>
         <p:spPr>
           <a:xfrm>
             <a:off x="6175369" y="3312966"/>
-            <a:ext cx="1575918" cy="1213639"/>
+            <a:ext cx="2096372" cy="1573283"/>
           </a:xfrm>
           <a:prstGeom prst="straightConnector1">
             <a:avLst/>
@@ -4583,7 +4277,7 @@
         <p:spPr>
           <a:xfrm flipV="1">
             <a:off x="6175369" y="1413050"/>
-            <a:ext cx="1421972" cy="1899916"/>
+            <a:ext cx="1955177" cy="1899916"/>
           </a:xfrm>
           <a:prstGeom prst="straightConnector1">
             <a:avLst/>
@@ -4610,24 +4304,24 @@
       </p:cxnSp>
       <p:cxnSp>
         <p:nvCxnSpPr>
-          <p:cNvPr id="117" name="Connettore 2 116">
-            <a:extLst>
-              <a:ext uri="{FF2B5EF4-FFF2-40B4-BE49-F238E27FC236}">
-                <a16:creationId xmlns:a16="http://schemas.microsoft.com/office/drawing/2014/main" id="{DFA7B5EE-203F-EFF0-742E-9467426D3F86}"/>
+          <p:cNvPr id="27" name="Connettore 2 26">
+            <a:extLst>
+              <a:ext uri="{FF2B5EF4-FFF2-40B4-BE49-F238E27FC236}">
+                <a16:creationId xmlns:a16="http://schemas.microsoft.com/office/drawing/2014/main" id="{FC645088-59A7-058B-7290-2E7844AA5454}"/>
               </a:ext>
             </a:extLst>
           </p:cNvPr>
           <p:cNvCxnSpPr>
             <a:cxnSpLocks/>
-            <a:stCxn id="41" idx="0"/>
-            <a:endCxn id="31" idx="1"/>
+            <a:stCxn id="41" idx="3"/>
+            <a:endCxn id="33" idx="2"/>
           </p:cNvCxnSpPr>
           <p:nvPr/>
         </p:nvCxnSpPr>
         <p:spPr>
           <a:xfrm flipV="1">
-            <a:off x="7751287" y="1413050"/>
-            <a:ext cx="2639954" cy="3113555"/>
+            <a:off x="9354576" y="3711652"/>
+            <a:ext cx="1880938" cy="1174597"/>
           </a:xfrm>
           <a:prstGeom prst="straightConnector1">
             <a:avLst/>
@@ -4654,200 +4348,24 @@
       </p:cxnSp>
       <p:cxnSp>
         <p:nvCxnSpPr>
-          <p:cNvPr id="121" name="Connettore 2 120">
-            <a:extLst>
-              <a:ext uri="{FF2B5EF4-FFF2-40B4-BE49-F238E27FC236}">
-                <a16:creationId xmlns:a16="http://schemas.microsoft.com/office/drawing/2014/main" id="{4F85AAEA-6C5F-C9E4-FA68-FF541D61513F}"/>
+          <p:cNvPr id="36" name="Connettore 2 35">
+            <a:extLst>
+              <a:ext uri="{FF2B5EF4-FFF2-40B4-BE49-F238E27FC236}">
+                <a16:creationId xmlns:a16="http://schemas.microsoft.com/office/drawing/2014/main" id="{85851779-F5EC-7BD7-731E-BEBE195FF274}"/>
               </a:ext>
             </a:extLst>
           </p:cNvPr>
           <p:cNvCxnSpPr>
             <a:cxnSpLocks/>
-            <a:stCxn id="34" idx="0"/>
-            <a:endCxn id="31" idx="1"/>
+            <a:stCxn id="41" idx="0"/>
+            <a:endCxn id="30" idx="2"/>
           </p:cNvCxnSpPr>
           <p:nvPr/>
         </p:nvCxnSpPr>
         <p:spPr>
           <a:xfrm flipV="1">
-            <a:off x="9947490" y="1413050"/>
-            <a:ext cx="443751" cy="3246764"/>
-          </a:xfrm>
-          <a:prstGeom prst="straightConnector1">
-            <a:avLst/>
-          </a:prstGeom>
-          <a:ln>
-            <a:headEnd type="triangle"/>
-            <a:tailEnd type="triangle"/>
-          </a:ln>
-        </p:spPr>
-        <p:style>
-          <a:lnRef idx="2">
-            <a:schemeClr val="accent1"/>
-          </a:lnRef>
-          <a:fillRef idx="0">
-            <a:schemeClr val="accent1"/>
-          </a:fillRef>
-          <a:effectRef idx="1">
-            <a:schemeClr val="accent1"/>
-          </a:effectRef>
-          <a:fontRef idx="minor">
-            <a:schemeClr val="tx1"/>
-          </a:fontRef>
-        </p:style>
-      </p:cxnSp>
-      <p:cxnSp>
-        <p:nvCxnSpPr>
-          <p:cNvPr id="125" name="Connettore 2 124">
-            <a:extLst>
-              <a:ext uri="{FF2B5EF4-FFF2-40B4-BE49-F238E27FC236}">
-                <a16:creationId xmlns:a16="http://schemas.microsoft.com/office/drawing/2014/main" id="{7A62706D-F866-39C7-32F5-57AD5CF42EC7}"/>
-              </a:ext>
-            </a:extLst>
-          </p:cNvPr>
-          <p:cNvCxnSpPr>
-            <a:cxnSpLocks/>
-            <a:stCxn id="33" idx="0"/>
-            <a:endCxn id="31" idx="2"/>
-          </p:cNvCxnSpPr>
-          <p:nvPr/>
-        </p:nvCxnSpPr>
-        <p:spPr>
-          <a:xfrm flipH="1" flipV="1">
-            <a:off x="10906761" y="1705817"/>
-            <a:ext cx="527771" cy="2291383"/>
-          </a:xfrm>
-          <a:prstGeom prst="straightConnector1">
-            <a:avLst/>
-          </a:prstGeom>
-          <a:ln>
-            <a:headEnd type="triangle"/>
-            <a:tailEnd type="triangle"/>
-          </a:ln>
-        </p:spPr>
-        <p:style>
-          <a:lnRef idx="2">
-            <a:schemeClr val="accent1"/>
-          </a:lnRef>
-          <a:fillRef idx="0">
-            <a:schemeClr val="accent1"/>
-          </a:fillRef>
-          <a:effectRef idx="1">
-            <a:schemeClr val="accent1"/>
-          </a:effectRef>
-          <a:fontRef idx="minor">
-            <a:schemeClr val="tx1"/>
-          </a:fontRef>
-        </p:style>
-      </p:cxnSp>
-      <p:cxnSp>
-        <p:nvCxnSpPr>
-          <p:cNvPr id="139" name="Connettore 2 138">
-            <a:extLst>
-              <a:ext uri="{FF2B5EF4-FFF2-40B4-BE49-F238E27FC236}">
-                <a16:creationId xmlns:a16="http://schemas.microsoft.com/office/drawing/2014/main" id="{873F71EF-AF1D-2318-B3F6-F50226C985AF}"/>
-              </a:ext>
-            </a:extLst>
-          </p:cNvPr>
-          <p:cNvCxnSpPr>
-            <a:cxnSpLocks/>
-            <a:stCxn id="33" idx="0"/>
-            <a:endCxn id="32" idx="2"/>
-          </p:cNvCxnSpPr>
-          <p:nvPr/>
-        </p:nvCxnSpPr>
-        <p:spPr>
-          <a:xfrm flipV="1">
-            <a:off x="11434532" y="2722067"/>
-            <a:ext cx="204020" cy="1275133"/>
-          </a:xfrm>
-          <a:prstGeom prst="straightConnector1">
-            <a:avLst/>
-          </a:prstGeom>
-          <a:ln>
-            <a:headEnd type="triangle"/>
-            <a:tailEnd type="triangle"/>
-          </a:ln>
-        </p:spPr>
-        <p:style>
-          <a:lnRef idx="2">
-            <a:schemeClr val="accent1"/>
-          </a:lnRef>
-          <a:fillRef idx="0">
-            <a:schemeClr val="accent1"/>
-          </a:fillRef>
-          <a:effectRef idx="1">
-            <a:schemeClr val="accent1"/>
-          </a:effectRef>
-          <a:fontRef idx="minor">
-            <a:schemeClr val="tx1"/>
-          </a:fontRef>
-        </p:style>
-      </p:cxnSp>
-      <p:cxnSp>
-        <p:nvCxnSpPr>
-          <p:cNvPr id="142" name="Connettore 2 141">
-            <a:extLst>
-              <a:ext uri="{FF2B5EF4-FFF2-40B4-BE49-F238E27FC236}">
-                <a16:creationId xmlns:a16="http://schemas.microsoft.com/office/drawing/2014/main" id="{E16ECAFF-9404-D24B-2BFA-4117E52DF37E}"/>
-              </a:ext>
-            </a:extLst>
-          </p:cNvPr>
-          <p:cNvCxnSpPr>
-            <a:cxnSpLocks/>
-            <a:stCxn id="34" idx="3"/>
-            <a:endCxn id="33" idx="1"/>
-          </p:cNvCxnSpPr>
-          <p:nvPr/>
-        </p:nvCxnSpPr>
-        <p:spPr>
-          <a:xfrm flipV="1">
-            <a:off x="10391241" y="4261903"/>
-            <a:ext cx="635252" cy="662613"/>
-          </a:xfrm>
-          <a:prstGeom prst="straightConnector1">
-            <a:avLst/>
-          </a:prstGeom>
-          <a:ln>
-            <a:headEnd type="triangle"/>
-            <a:tailEnd type="triangle"/>
-          </a:ln>
-        </p:spPr>
-        <p:style>
-          <a:lnRef idx="2">
-            <a:schemeClr val="accent1"/>
-          </a:lnRef>
-          <a:fillRef idx="0">
-            <a:schemeClr val="accent1"/>
-          </a:fillRef>
-          <a:effectRef idx="1">
-            <a:schemeClr val="accent1"/>
-          </a:effectRef>
-          <a:fontRef idx="minor">
-            <a:schemeClr val="tx1"/>
-          </a:fontRef>
-        </p:style>
-      </p:cxnSp>
-      <p:cxnSp>
-        <p:nvCxnSpPr>
-          <p:cNvPr id="145" name="Connettore 2 144">
-            <a:extLst>
-              <a:ext uri="{FF2B5EF4-FFF2-40B4-BE49-F238E27FC236}">
-                <a16:creationId xmlns:a16="http://schemas.microsoft.com/office/drawing/2014/main" id="{39D77460-6BC8-A37C-07A6-9E5ADAE9F749}"/>
-              </a:ext>
-            </a:extLst>
-          </p:cNvPr>
-          <p:cNvCxnSpPr>
-            <a:cxnSpLocks/>
-            <a:stCxn id="41" idx="3"/>
-            <a:endCxn id="34" idx="1"/>
-          </p:cNvCxnSpPr>
-          <p:nvPr/>
-        </p:nvCxnSpPr>
-        <p:spPr>
-          <a:xfrm>
-            <a:off x="8292704" y="4889265"/>
-            <a:ext cx="1211035" cy="35251"/>
+            <a:off x="8813159" y="1984162"/>
+            <a:ext cx="1" cy="2539427"/>
           </a:xfrm>
           <a:prstGeom prst="straightConnector1">
             <a:avLst/>

</xml_diff>

<commit_message>
ADDED rbac in accountService,some tests in client throught ApiGateway
</commit_message>
<xml_diff>
--- a/Design draft.pptx
+++ b/Design draft.pptx
@@ -259,7 +259,7 @@
           <a:p>
             <a:fld id="{804FACE1-603D-405D-9BCD-7A01BF53AE91}" type="datetimeFigureOut">
               <a:rPr lang="it-IT" smtClean="0"/>
-              <a:t>20/03/2025</a:t>
+              <a:t>26/03/2025</a:t>
             </a:fld>
             <a:endParaRPr lang="it-IT"/>
           </a:p>
@@ -457,7 +457,7 @@
           <a:p>
             <a:fld id="{804FACE1-603D-405D-9BCD-7A01BF53AE91}" type="datetimeFigureOut">
               <a:rPr lang="it-IT" smtClean="0"/>
-              <a:t>20/03/2025</a:t>
+              <a:t>26/03/2025</a:t>
             </a:fld>
             <a:endParaRPr lang="it-IT"/>
           </a:p>
@@ -665,7 +665,7 @@
           <a:p>
             <a:fld id="{804FACE1-603D-405D-9BCD-7A01BF53AE91}" type="datetimeFigureOut">
               <a:rPr lang="it-IT" smtClean="0"/>
-              <a:t>20/03/2025</a:t>
+              <a:t>26/03/2025</a:t>
             </a:fld>
             <a:endParaRPr lang="it-IT"/>
           </a:p>
@@ -863,7 +863,7 @@
           <a:p>
             <a:fld id="{804FACE1-603D-405D-9BCD-7A01BF53AE91}" type="datetimeFigureOut">
               <a:rPr lang="it-IT" smtClean="0"/>
-              <a:t>20/03/2025</a:t>
+              <a:t>26/03/2025</a:t>
             </a:fld>
             <a:endParaRPr lang="it-IT"/>
           </a:p>
@@ -1138,7 +1138,7 @@
           <a:p>
             <a:fld id="{804FACE1-603D-405D-9BCD-7A01BF53AE91}" type="datetimeFigureOut">
               <a:rPr lang="it-IT" smtClean="0"/>
-              <a:t>20/03/2025</a:t>
+              <a:t>26/03/2025</a:t>
             </a:fld>
             <a:endParaRPr lang="it-IT"/>
           </a:p>
@@ -1403,7 +1403,7 @@
           <a:p>
             <a:fld id="{804FACE1-603D-405D-9BCD-7A01BF53AE91}" type="datetimeFigureOut">
               <a:rPr lang="it-IT" smtClean="0"/>
-              <a:t>20/03/2025</a:t>
+              <a:t>26/03/2025</a:t>
             </a:fld>
             <a:endParaRPr lang="it-IT"/>
           </a:p>
@@ -1815,7 +1815,7 @@
           <a:p>
             <a:fld id="{804FACE1-603D-405D-9BCD-7A01BF53AE91}" type="datetimeFigureOut">
               <a:rPr lang="it-IT" smtClean="0"/>
-              <a:t>20/03/2025</a:t>
+              <a:t>26/03/2025</a:t>
             </a:fld>
             <a:endParaRPr lang="it-IT"/>
           </a:p>
@@ -1956,7 +1956,7 @@
           <a:p>
             <a:fld id="{804FACE1-603D-405D-9BCD-7A01BF53AE91}" type="datetimeFigureOut">
               <a:rPr lang="it-IT" smtClean="0"/>
-              <a:t>20/03/2025</a:t>
+              <a:t>26/03/2025</a:t>
             </a:fld>
             <a:endParaRPr lang="it-IT"/>
           </a:p>
@@ -2069,7 +2069,7 @@
           <a:p>
             <a:fld id="{804FACE1-603D-405D-9BCD-7A01BF53AE91}" type="datetimeFigureOut">
               <a:rPr lang="it-IT" smtClean="0"/>
-              <a:t>20/03/2025</a:t>
+              <a:t>26/03/2025</a:t>
             </a:fld>
             <a:endParaRPr lang="it-IT"/>
           </a:p>
@@ -2380,7 +2380,7 @@
           <a:p>
             <a:fld id="{804FACE1-603D-405D-9BCD-7A01BF53AE91}" type="datetimeFigureOut">
               <a:rPr lang="it-IT" smtClean="0"/>
-              <a:t>20/03/2025</a:t>
+              <a:t>26/03/2025</a:t>
             </a:fld>
             <a:endParaRPr lang="it-IT"/>
           </a:p>
@@ -2668,7 +2668,7 @@
           <a:p>
             <a:fld id="{804FACE1-603D-405D-9BCD-7A01BF53AE91}" type="datetimeFigureOut">
               <a:rPr lang="it-IT" smtClean="0"/>
-              <a:t>20/03/2025</a:t>
+              <a:t>26/03/2025</a:t>
             </a:fld>
             <a:endParaRPr lang="it-IT"/>
           </a:p>
@@ -2909,7 +2909,7 @@
           <a:p>
             <a:fld id="{804FACE1-603D-405D-9BCD-7A01BF53AE91}" type="datetimeFigureOut">
               <a:rPr lang="it-IT" smtClean="0"/>
-              <a:t>20/03/2025</a:t>
+              <a:t>26/03/2025</a:t>
             </a:fld>
             <a:endParaRPr lang="it-IT"/>
           </a:p>
@@ -3833,8 +3833,8 @@
         </p:nvSpPr>
         <p:spPr>
           <a:xfrm rot="5400000">
-            <a:off x="9105428" y="3288933"/>
-            <a:ext cx="725320" cy="4744048"/>
+            <a:off x="9586133" y="3769638"/>
+            <a:ext cx="725320" cy="3782637"/>
           </a:xfrm>
           <a:prstGeom prst="rightBrace">
             <a:avLst/>
@@ -3877,7 +3877,7 @@
         </p:nvSpPr>
         <p:spPr>
           <a:xfrm>
-            <a:off x="8683276" y="6058640"/>
+            <a:off x="9216676" y="6100340"/>
             <a:ext cx="1838632" cy="323165"/>
           </a:xfrm>
           <a:prstGeom prst="rect">

</xml_diff>

<commit_message>
final commit: ADDED documentation
</commit_message>
<xml_diff>
--- a/Design draft.pptx
+++ b/Design draft.pptx
@@ -259,7 +259,7 @@
           <a:p>
             <a:fld id="{804FACE1-603D-405D-9BCD-7A01BF53AE91}" type="datetimeFigureOut">
               <a:rPr lang="it-IT" smtClean="0"/>
-              <a:t>26/03/2025</a:t>
+              <a:t>17/04/2025</a:t>
             </a:fld>
             <a:endParaRPr lang="it-IT"/>
           </a:p>
@@ -457,7 +457,7 @@
           <a:p>
             <a:fld id="{804FACE1-603D-405D-9BCD-7A01BF53AE91}" type="datetimeFigureOut">
               <a:rPr lang="it-IT" smtClean="0"/>
-              <a:t>26/03/2025</a:t>
+              <a:t>17/04/2025</a:t>
             </a:fld>
             <a:endParaRPr lang="it-IT"/>
           </a:p>
@@ -665,7 +665,7 @@
           <a:p>
             <a:fld id="{804FACE1-603D-405D-9BCD-7A01BF53AE91}" type="datetimeFigureOut">
               <a:rPr lang="it-IT" smtClean="0"/>
-              <a:t>26/03/2025</a:t>
+              <a:t>17/04/2025</a:t>
             </a:fld>
             <a:endParaRPr lang="it-IT"/>
           </a:p>
@@ -863,7 +863,7 @@
           <a:p>
             <a:fld id="{804FACE1-603D-405D-9BCD-7A01BF53AE91}" type="datetimeFigureOut">
               <a:rPr lang="it-IT" smtClean="0"/>
-              <a:t>26/03/2025</a:t>
+              <a:t>17/04/2025</a:t>
             </a:fld>
             <a:endParaRPr lang="it-IT"/>
           </a:p>
@@ -1138,7 +1138,7 @@
           <a:p>
             <a:fld id="{804FACE1-603D-405D-9BCD-7A01BF53AE91}" type="datetimeFigureOut">
               <a:rPr lang="it-IT" smtClean="0"/>
-              <a:t>26/03/2025</a:t>
+              <a:t>17/04/2025</a:t>
             </a:fld>
             <a:endParaRPr lang="it-IT"/>
           </a:p>
@@ -1403,7 +1403,7 @@
           <a:p>
             <a:fld id="{804FACE1-603D-405D-9BCD-7A01BF53AE91}" type="datetimeFigureOut">
               <a:rPr lang="it-IT" smtClean="0"/>
-              <a:t>26/03/2025</a:t>
+              <a:t>17/04/2025</a:t>
             </a:fld>
             <a:endParaRPr lang="it-IT"/>
           </a:p>
@@ -1815,7 +1815,7 @@
           <a:p>
             <a:fld id="{804FACE1-603D-405D-9BCD-7A01BF53AE91}" type="datetimeFigureOut">
               <a:rPr lang="it-IT" smtClean="0"/>
-              <a:t>26/03/2025</a:t>
+              <a:t>17/04/2025</a:t>
             </a:fld>
             <a:endParaRPr lang="it-IT"/>
           </a:p>
@@ -1956,7 +1956,7 @@
           <a:p>
             <a:fld id="{804FACE1-603D-405D-9BCD-7A01BF53AE91}" type="datetimeFigureOut">
               <a:rPr lang="it-IT" smtClean="0"/>
-              <a:t>26/03/2025</a:t>
+              <a:t>17/04/2025</a:t>
             </a:fld>
             <a:endParaRPr lang="it-IT"/>
           </a:p>
@@ -2069,7 +2069,7 @@
           <a:p>
             <a:fld id="{804FACE1-603D-405D-9BCD-7A01BF53AE91}" type="datetimeFigureOut">
               <a:rPr lang="it-IT" smtClean="0"/>
-              <a:t>26/03/2025</a:t>
+              <a:t>17/04/2025</a:t>
             </a:fld>
             <a:endParaRPr lang="it-IT"/>
           </a:p>
@@ -2380,7 +2380,7 @@
           <a:p>
             <a:fld id="{804FACE1-603D-405D-9BCD-7A01BF53AE91}" type="datetimeFigureOut">
               <a:rPr lang="it-IT" smtClean="0"/>
-              <a:t>26/03/2025</a:t>
+              <a:t>17/04/2025</a:t>
             </a:fld>
             <a:endParaRPr lang="it-IT"/>
           </a:p>
@@ -2668,7 +2668,7 @@
           <a:p>
             <a:fld id="{804FACE1-603D-405D-9BCD-7A01BF53AE91}" type="datetimeFigureOut">
               <a:rPr lang="it-IT" smtClean="0"/>
-              <a:t>26/03/2025</a:t>
+              <a:t>17/04/2025</a:t>
             </a:fld>
             <a:endParaRPr lang="it-IT"/>
           </a:p>
@@ -2909,7 +2909,7 @@
           <a:p>
             <a:fld id="{804FACE1-603D-405D-9BCD-7A01BF53AE91}" type="datetimeFigureOut">
               <a:rPr lang="it-IT" smtClean="0"/>
-              <a:t>26/03/2025</a:t>
+              <a:t>17/04/2025</a:t>
             </a:fld>
             <a:endParaRPr lang="it-IT"/>
           </a:p>
@@ -3375,10 +3375,12 @@
           <a:p>
             <a:pPr algn="ctr"/>
             <a:r>
-              <a:rPr lang="it-IT" dirty="0">
+              <a:rPr lang="it-IT" sz="2500" dirty="0">
                 <a:solidFill>
                   <a:srgbClr val="FF0000"/>
                 </a:solidFill>
+                <a:latin typeface="Times New Roman" panose="02020603050405020304" pitchFamily="18" charset="0"/>
+                <a:cs typeface="Times New Roman" panose="02020603050405020304" pitchFamily="18" charset="0"/>
               </a:rPr>
               <a:t>CLIENT</a:t>
             </a:r>
@@ -3434,12 +3436,14 @@
           <a:p>
             <a:pPr algn="ctr"/>
             <a:r>
-              <a:rPr lang="it-IT" dirty="0">
+              <a:rPr lang="it-IT" sz="2500" dirty="0">
                 <a:solidFill>
                   <a:srgbClr val="FF0000"/>
                 </a:solidFill>
+                <a:latin typeface="Times New Roman" panose="02020603050405020304" pitchFamily="18" charset="0"/>
+                <a:cs typeface="Times New Roman" panose="02020603050405020304" pitchFamily="18" charset="0"/>
               </a:rPr>
-              <a:t>SERVER</a:t>
+              <a:t> SERVER</a:t>
             </a:r>
           </a:p>
         </p:txBody>
@@ -3460,22 +3464,23 @@
         </p:nvCxnSpPr>
         <p:spPr>
           <a:xfrm flipH="1">
-            <a:off x="4630615" y="5232"/>
+            <a:off x="4835347" y="0"/>
             <a:ext cx="22000" cy="6818354"/>
           </a:xfrm>
           <a:prstGeom prst="line">
             <a:avLst/>
           </a:prstGeom>
+          <a:ln w="15875"/>
         </p:spPr>
         <p:style>
           <a:lnRef idx="1">
-            <a:schemeClr val="accent6"/>
+            <a:schemeClr val="accent1"/>
           </a:lnRef>
           <a:fillRef idx="0">
-            <a:schemeClr val="accent6"/>
+            <a:schemeClr val="accent1"/>
           </a:fillRef>
           <a:effectRef idx="0">
-            <a:schemeClr val="accent6"/>
+            <a:schemeClr val="accent1"/>
           </a:effectRef>
           <a:fontRef idx="minor">
             <a:schemeClr val="tx1"/>
@@ -3496,8 +3501,8 @@
         </p:nvSpPr>
         <p:spPr>
           <a:xfrm>
-            <a:off x="213384" y="3061758"/>
-            <a:ext cx="1046488" cy="502415"/>
+            <a:off x="102191" y="3061758"/>
+            <a:ext cx="1157681" cy="502415"/>
           </a:xfrm>
           <a:prstGeom prst="rect">
             <a:avLst/>
@@ -3530,12 +3535,14 @@
           <a:p>
             <a:pPr algn="ctr"/>
             <a:r>
-              <a:rPr lang="it-IT" dirty="0">
+              <a:rPr lang="it-IT" sz="2000" dirty="0">
                 <a:solidFill>
                   <a:schemeClr val="bg1"/>
                 </a:solidFill>
+                <a:latin typeface="Times New Roman" panose="02020603050405020304" pitchFamily="18" charset="0"/>
+                <a:cs typeface="Times New Roman" panose="02020603050405020304" pitchFamily="18" charset="0"/>
               </a:rPr>
-              <a:t>CLIENT (UI/GUI)</a:t>
+              <a:t>CLIENT </a:t>
             </a:r>
           </a:p>
         </p:txBody>
@@ -3554,8 +3561,8 @@
         </p:nvSpPr>
         <p:spPr>
           <a:xfrm>
-            <a:off x="2158600" y="2805135"/>
-            <a:ext cx="1415845" cy="1015662"/>
+            <a:off x="1692492" y="3061754"/>
+            <a:ext cx="1244050" cy="502419"/>
           </a:xfrm>
           <a:prstGeom prst="rect">
             <a:avLst/>
@@ -3588,79 +3595,34 @@
           <a:p>
             <a:pPr algn="ctr"/>
             <a:r>
-              <a:rPr lang="it-IT" dirty="0">
+              <a:rPr lang="it-IT" sz="2000" dirty="0">
                 <a:solidFill>
                   <a:schemeClr val="bg1"/>
                 </a:solidFill>
+                <a:latin typeface="Times New Roman" panose="02020603050405020304" pitchFamily="18" charset="0"/>
+                <a:cs typeface="Times New Roman" panose="02020603050405020304" pitchFamily="18" charset="0"/>
               </a:rPr>
-              <a:t>FACADE /SERVICE LAYER(+ DTO)</a:t>
-            </a:r>
-          </a:p>
-        </p:txBody>
-      </p:sp>
-      <p:sp>
-        <p:nvSpPr>
-          <p:cNvPr id="14" name="CasellaDiTesto 13">
-            <a:extLst>
-              <a:ext uri="{FF2B5EF4-FFF2-40B4-BE49-F238E27FC236}">
-                <a16:creationId xmlns:a16="http://schemas.microsoft.com/office/drawing/2014/main" id="{93DA4842-F2AE-C6C9-19C4-5E6F6D45C4E5}"/>
-              </a:ext>
-            </a:extLst>
-          </p:cNvPr>
-          <p:cNvSpPr txBox="1"/>
+              <a:t>FACADE</a:t>
+            </a:r>
+          </a:p>
+        </p:txBody>
+      </p:sp>
+      <p:sp>
+        <p:nvSpPr>
+          <p:cNvPr id="19" name="Rettangolo 18">
+            <a:extLst>
+              <a:ext uri="{FF2B5EF4-FFF2-40B4-BE49-F238E27FC236}">
+                <a16:creationId xmlns:a16="http://schemas.microsoft.com/office/drawing/2014/main" id="{8A5E8818-03DA-2D1D-00FE-5660E1DC7465}"/>
+              </a:ext>
+            </a:extLst>
+          </p:cNvPr>
+          <p:cNvSpPr/>
           <p:nvPr/>
         </p:nvSpPr>
         <p:spPr>
           <a:xfrm>
-            <a:off x="1992262" y="3924669"/>
-            <a:ext cx="1838632" cy="1015663"/>
-          </a:xfrm>
-          <a:prstGeom prst="rect">
-            <a:avLst/>
-          </a:prstGeom>
-          <a:noFill/>
-        </p:spPr>
-        <p:txBody>
-          <a:bodyPr wrap="square" rtlCol="0">
-            <a:spAutoFit/>
-          </a:bodyPr>
-          <a:lstStyle/>
-          <a:p>
-            <a:r>
-              <a:rPr lang="it-IT" sz="1500" dirty="0"/>
-              <a:t>ASSEMBLER </a:t>
-            </a:r>
-          </a:p>
-          <a:p>
-            <a:r>
-              <a:rPr lang="it-IT" sz="1500" dirty="0"/>
-              <a:t>DI RICHIESTE/</a:t>
-            </a:r>
-          </a:p>
-          <a:p>
-            <a:r>
-              <a:rPr lang="it-IT" sz="1500" dirty="0"/>
-              <a:t>RISPOSTE SEMPLIFICATE</a:t>
-            </a:r>
-          </a:p>
-        </p:txBody>
-      </p:sp>
-      <p:sp>
-        <p:nvSpPr>
-          <p:cNvPr id="19" name="Rettangolo 18">
-            <a:extLst>
-              <a:ext uri="{FF2B5EF4-FFF2-40B4-BE49-F238E27FC236}">
-                <a16:creationId xmlns:a16="http://schemas.microsoft.com/office/drawing/2014/main" id="{8A5E8818-03DA-2D1D-00FE-5660E1DC7465}"/>
-              </a:ext>
-            </a:extLst>
-          </p:cNvPr>
-          <p:cNvSpPr/>
-          <p:nvPr/>
-        </p:nvSpPr>
-        <p:spPr>
-          <a:xfrm>
-            <a:off x="4759524" y="3061758"/>
-            <a:ext cx="1415845" cy="502415"/>
+            <a:off x="5276688" y="2990461"/>
+            <a:ext cx="1415845" cy="645004"/>
           </a:xfrm>
           <a:prstGeom prst="rect">
             <a:avLst/>
@@ -3693,10 +3655,12 @@
           <a:p>
             <a:pPr algn="ctr"/>
             <a:r>
-              <a:rPr lang="it-IT" dirty="0">
+              <a:rPr lang="it-IT" sz="2000" dirty="0">
                 <a:solidFill>
                   <a:schemeClr val="bg1"/>
                 </a:solidFill>
+                <a:latin typeface="Times New Roman" panose="02020603050405020304" pitchFamily="18" charset="0"/>
+                <a:cs typeface="Times New Roman" panose="02020603050405020304" pitchFamily="18" charset="0"/>
               </a:rPr>
               <a:t>API GATEWAY</a:t>
             </a:r>
@@ -3717,8 +3681,8 @@
         </p:nvSpPr>
         <p:spPr>
           <a:xfrm>
-            <a:off x="8130546" y="841937"/>
-            <a:ext cx="1365227" cy="1142225"/>
+            <a:off x="7742894" y="1015085"/>
+            <a:ext cx="2541648" cy="1461629"/>
           </a:xfrm>
           <a:prstGeom prst="rect">
             <a:avLst/>
@@ -3751,12 +3715,74 @@
           <a:p>
             <a:pPr algn="ctr"/>
             <a:r>
-              <a:rPr lang="it-IT" sz="1200" dirty="0">
+              <a:rPr lang="it-IT" sz="2000" dirty="0">
                 <a:solidFill>
                   <a:schemeClr val="bg1"/>
                 </a:solidFill>
+                <a:latin typeface="Times New Roman" panose="02020603050405020304" pitchFamily="18" charset="0"/>
+                <a:cs typeface="Times New Roman" panose="02020603050405020304" pitchFamily="18" charset="0"/>
               </a:rPr>
-              <a:t>ACCOUNT SERVICE (AUTHENTICATOR + TOKEN + RBAC)</a:t>
+              <a:t>ACCOUNT SERVICE (</a:t>
+            </a:r>
+            <a:r>
+              <a:rPr lang="it-IT" sz="2000" b="1" i="1" dirty="0">
+                <a:solidFill>
+                  <a:schemeClr val="bg1"/>
+                </a:solidFill>
+                <a:latin typeface="Times New Roman" panose="02020603050405020304" pitchFamily="18" charset="0"/>
+                <a:cs typeface="Times New Roman" panose="02020603050405020304" pitchFamily="18" charset="0"/>
+              </a:rPr>
+              <a:t>AUTHENTICATOR</a:t>
+            </a:r>
+            <a:r>
+              <a:rPr lang="it-IT" sz="2000" dirty="0">
+                <a:solidFill>
+                  <a:schemeClr val="bg1"/>
+                </a:solidFill>
+                <a:latin typeface="Times New Roman" panose="02020603050405020304" pitchFamily="18" charset="0"/>
+                <a:cs typeface="Times New Roman" panose="02020603050405020304" pitchFamily="18" charset="0"/>
+              </a:rPr>
+              <a:t> + </a:t>
+            </a:r>
+            <a:r>
+              <a:rPr lang="it-IT" sz="2000" b="1" i="1" dirty="0">
+                <a:solidFill>
+                  <a:schemeClr val="bg1"/>
+                </a:solidFill>
+                <a:latin typeface="Times New Roman" panose="02020603050405020304" pitchFamily="18" charset="0"/>
+                <a:cs typeface="Times New Roman" panose="02020603050405020304" pitchFamily="18" charset="0"/>
+              </a:rPr>
+              <a:t>TOKEN</a:t>
+            </a:r>
+            <a:r>
+              <a:rPr lang="it-IT" sz="2000" dirty="0">
+                <a:solidFill>
+                  <a:schemeClr val="bg1"/>
+                </a:solidFill>
+                <a:latin typeface="Times New Roman" panose="02020603050405020304" pitchFamily="18" charset="0"/>
+                <a:cs typeface="Times New Roman" panose="02020603050405020304" pitchFamily="18" charset="0"/>
+              </a:rPr>
+              <a:t> + </a:t>
+            </a:r>
+            <a:r>
+              <a:rPr lang="it-IT" sz="2000" b="1" i="1" dirty="0">
+                <a:solidFill>
+                  <a:schemeClr val="bg1"/>
+                </a:solidFill>
+                <a:latin typeface="Times New Roman" panose="02020603050405020304" pitchFamily="18" charset="0"/>
+                <a:cs typeface="Times New Roman" panose="02020603050405020304" pitchFamily="18" charset="0"/>
+              </a:rPr>
+              <a:t>RBAC</a:t>
+            </a:r>
+            <a:r>
+              <a:rPr lang="it-IT" sz="2000" dirty="0">
+                <a:solidFill>
+                  <a:schemeClr val="bg1"/>
+                </a:solidFill>
+                <a:latin typeface="Times New Roman" panose="02020603050405020304" pitchFamily="18" charset="0"/>
+                <a:cs typeface="Times New Roman" panose="02020603050405020304" pitchFamily="18" charset="0"/>
+              </a:rPr>
+              <a:t>)</a:t>
             </a:r>
           </a:p>
         </p:txBody>
@@ -3775,8 +3801,8 @@
         </p:nvSpPr>
         <p:spPr>
           <a:xfrm>
-            <a:off x="10521908" y="2986332"/>
-            <a:ext cx="1427211" cy="725320"/>
+            <a:off x="10284542" y="2808264"/>
+            <a:ext cx="1694074" cy="1009397"/>
           </a:xfrm>
           <a:prstGeom prst="rect">
             <a:avLst/>
@@ -3809,10 +3835,12 @@
           <a:p>
             <a:pPr algn="ctr"/>
             <a:r>
-              <a:rPr lang="it-IT" sz="1500" dirty="0">
+              <a:rPr lang="it-IT" sz="2000" dirty="0">
                 <a:solidFill>
                   <a:schemeClr val="bg1"/>
                 </a:solidFill>
+                <a:latin typeface="Times New Roman" panose="02020603050405020304" pitchFamily="18" charset="0"/>
+                <a:cs typeface="Times New Roman" panose="02020603050405020304" pitchFamily="18" charset="0"/>
               </a:rPr>
               <a:t>CART SERVICE</a:t>
             </a:r>
@@ -3833,8 +3861,8 @@
         </p:nvSpPr>
         <p:spPr>
           <a:xfrm rot="5400000">
-            <a:off x="9586133" y="3769638"/>
-            <a:ext cx="725320" cy="3782637"/>
+            <a:off x="9337656" y="3521161"/>
+            <a:ext cx="725320" cy="4279592"/>
           </a:xfrm>
           <a:prstGeom prst="rightBrace">
             <a:avLst/>
@@ -3859,7 +3887,10 @@
           <a:lstStyle/>
           <a:p>
             <a:pPr algn="ctr"/>
-            <a:endParaRPr lang="it-IT"/>
+            <a:endParaRPr lang="it-IT">
+              <a:latin typeface="Times New Roman" panose="02020603050405020304" pitchFamily="18" charset="0"/>
+              <a:cs typeface="Times New Roman" panose="02020603050405020304" pitchFamily="18" charset="0"/>
+            </a:endParaRPr>
           </a:p>
         </p:txBody>
       </p:sp>
@@ -3877,8 +3908,8 @@
         </p:nvSpPr>
         <p:spPr>
           <a:xfrm>
-            <a:off x="9216676" y="6100340"/>
-            <a:ext cx="1838632" cy="323165"/>
+            <a:off x="8577841" y="6023617"/>
+            <a:ext cx="2601436" cy="400110"/>
           </a:xfrm>
           <a:prstGeom prst="rect">
             <a:avLst/>
@@ -3892,7 +3923,10 @@
           <a:lstStyle/>
           <a:p>
             <a:r>
-              <a:rPr lang="it-IT" sz="1500" dirty="0"/>
+              <a:rPr lang="it-IT" sz="2000" b="1" i="1" dirty="0">
+                <a:latin typeface="Times New Roman" panose="02020603050405020304" pitchFamily="18" charset="0"/>
+                <a:cs typeface="Times New Roman" panose="02020603050405020304" pitchFamily="18" charset="0"/>
+              </a:rPr>
               <a:t>DB PER SERVICE</a:t>
             </a:r>
           </a:p>
@@ -3912,8 +3946,8 @@
         </p:nvSpPr>
         <p:spPr>
           <a:xfrm>
-            <a:off x="8271741" y="4523589"/>
-            <a:ext cx="1082835" cy="725319"/>
+            <a:off x="7877774" y="4149213"/>
+            <a:ext cx="1870771" cy="1099695"/>
           </a:xfrm>
           <a:prstGeom prst="rect">
             <a:avLst/>
@@ -3946,22 +3980,84 @@
           <a:p>
             <a:pPr algn="ctr"/>
             <a:r>
-              <a:rPr lang="it-IT" sz="1200" dirty="0">
+              <a:rPr lang="it-IT" sz="2000" dirty="0">
                 <a:solidFill>
                   <a:schemeClr val="bg1"/>
                 </a:solidFill>
+                <a:latin typeface="Times New Roman" panose="02020603050405020304" pitchFamily="18" charset="0"/>
+                <a:cs typeface="Times New Roman" panose="02020603050405020304" pitchFamily="18" charset="0"/>
               </a:rPr>
               <a:t>CREDITCARD SERVICE</a:t>
             </a:r>
           </a:p>
         </p:txBody>
       </p:sp>
+      <p:sp>
+        <p:nvSpPr>
+          <p:cNvPr id="6" name="Rettangolo 5">
+            <a:extLst>
+              <a:ext uri="{FF2B5EF4-FFF2-40B4-BE49-F238E27FC236}">
+                <a16:creationId xmlns:a16="http://schemas.microsoft.com/office/drawing/2014/main" id="{4CE48E35-13D3-C58D-F038-CBFED39BE978}"/>
+              </a:ext>
+            </a:extLst>
+          </p:cNvPr>
+          <p:cNvSpPr/>
+          <p:nvPr/>
+        </p:nvSpPr>
+        <p:spPr>
+          <a:xfrm>
+            <a:off x="3294089" y="3061753"/>
+            <a:ext cx="1193376" cy="502419"/>
+          </a:xfrm>
+          <a:prstGeom prst="rect">
+            <a:avLst/>
+          </a:prstGeom>
+          <a:solidFill>
+            <a:schemeClr val="accent1">
+              <a:lumMod val="75000"/>
+            </a:schemeClr>
+          </a:solidFill>
+        </p:spPr>
+        <p:style>
+          <a:lnRef idx="2">
+            <a:schemeClr val="accent1">
+              <a:shade val="15000"/>
+            </a:schemeClr>
+          </a:lnRef>
+          <a:fillRef idx="1">
+            <a:schemeClr val="accent1"/>
+          </a:fillRef>
+          <a:effectRef idx="0">
+            <a:schemeClr val="accent1"/>
+          </a:effectRef>
+          <a:fontRef idx="minor">
+            <a:schemeClr val="lt1"/>
+          </a:fontRef>
+        </p:style>
+        <p:txBody>
+          <a:bodyPr rtlCol="0" anchor="ctr"/>
+          <a:lstStyle/>
+          <a:p>
+            <a:pPr algn="ctr"/>
+            <a:r>
+              <a:rPr lang="it-IT" sz="2000" dirty="0">
+                <a:solidFill>
+                  <a:schemeClr val="bg1"/>
+                </a:solidFill>
+                <a:latin typeface="Times New Roman" panose="02020603050405020304" pitchFamily="18" charset="0"/>
+                <a:cs typeface="Times New Roman" panose="02020603050405020304" pitchFamily="18" charset="0"/>
+              </a:rPr>
+              <a:t>SENDER</a:t>
+            </a:r>
+          </a:p>
+        </p:txBody>
+      </p:sp>
       <p:cxnSp>
         <p:nvCxnSpPr>
-          <p:cNvPr id="62" name="Connettore 2 61">
-            <a:extLst>
-              <a:ext uri="{FF2B5EF4-FFF2-40B4-BE49-F238E27FC236}">
-                <a16:creationId xmlns:a16="http://schemas.microsoft.com/office/drawing/2014/main" id="{380B18F1-3A28-FFD2-5F4D-C35312E30C25}"/>
+          <p:cNvPr id="10" name="Connettore 2 9">
+            <a:extLst>
+              <a:ext uri="{FF2B5EF4-FFF2-40B4-BE49-F238E27FC236}">
+                <a16:creationId xmlns:a16="http://schemas.microsoft.com/office/drawing/2014/main" id="{732C6EB6-4509-EAC6-3373-92D026C2173D}"/>
               </a:ext>
             </a:extLst>
           </p:cNvPr>
@@ -3973,15 +4069,14 @@
           <p:nvPr/>
         </p:nvCxnSpPr>
         <p:spPr>
-          <a:xfrm>
-            <a:off x="1259872" y="3312966"/>
-            <a:ext cx="898728" cy="0"/>
+          <a:xfrm flipV="1">
+            <a:off x="1259872" y="3312964"/>
+            <a:ext cx="432620" cy="2"/>
           </a:xfrm>
           <a:prstGeom prst="straightConnector1">
             <a:avLst/>
           </a:prstGeom>
           <a:ln>
-            <a:headEnd type="triangle"/>
             <a:tailEnd type="triangle"/>
           </a:ln>
         </p:spPr>
@@ -4002,156 +4097,29 @@
       </p:cxnSp>
       <p:cxnSp>
         <p:nvCxnSpPr>
-          <p:cNvPr id="63" name="Connettore 2 62">
-            <a:extLst>
-              <a:ext uri="{FF2B5EF4-FFF2-40B4-BE49-F238E27FC236}">
-                <a16:creationId xmlns:a16="http://schemas.microsoft.com/office/drawing/2014/main" id="{22AA39EF-5C05-D832-F0F2-FA33E4351CBC}"/>
+          <p:cNvPr id="11" name="Connettore 2 10">
+            <a:extLst>
+              <a:ext uri="{FF2B5EF4-FFF2-40B4-BE49-F238E27FC236}">
+                <a16:creationId xmlns:a16="http://schemas.microsoft.com/office/drawing/2014/main" id="{99766908-6D0C-D725-1717-1F791F46E1A1}"/>
               </a:ext>
             </a:extLst>
           </p:cNvPr>
           <p:cNvCxnSpPr>
             <a:cxnSpLocks/>
             <a:stCxn id="13" idx="3"/>
-            <a:endCxn id="19" idx="1"/>
+            <a:endCxn id="6" idx="1"/>
           </p:cNvCxnSpPr>
           <p:nvPr/>
         </p:nvCxnSpPr>
         <p:spPr>
-          <a:xfrm>
-            <a:off x="3574445" y="3312966"/>
-            <a:ext cx="1185079" cy="0"/>
+          <a:xfrm flipV="1">
+            <a:off x="2936542" y="3312963"/>
+            <a:ext cx="357547" cy="1"/>
           </a:xfrm>
           <a:prstGeom prst="straightConnector1">
             <a:avLst/>
           </a:prstGeom>
           <a:ln>
-            <a:headEnd type="triangle"/>
-            <a:tailEnd type="triangle"/>
-          </a:ln>
-        </p:spPr>
-        <p:style>
-          <a:lnRef idx="2">
-            <a:schemeClr val="accent1"/>
-          </a:lnRef>
-          <a:fillRef idx="0">
-            <a:schemeClr val="accent1"/>
-          </a:fillRef>
-          <a:effectRef idx="1">
-            <a:schemeClr val="accent1"/>
-          </a:effectRef>
-          <a:fontRef idx="minor">
-            <a:schemeClr val="tx1"/>
-          </a:fontRef>
-        </p:style>
-      </p:cxnSp>
-      <p:sp>
-        <p:nvSpPr>
-          <p:cNvPr id="71" name="CasellaDiTesto 70">
-            <a:extLst>
-              <a:ext uri="{FF2B5EF4-FFF2-40B4-BE49-F238E27FC236}">
-                <a16:creationId xmlns:a16="http://schemas.microsoft.com/office/drawing/2014/main" id="{52143E1C-E629-C43A-049B-C7B49982AD4F}"/>
-              </a:ext>
-            </a:extLst>
-          </p:cNvPr>
-          <p:cNvSpPr txBox="1"/>
-          <p:nvPr/>
-        </p:nvSpPr>
-        <p:spPr>
-          <a:xfrm>
-            <a:off x="4806166" y="1806053"/>
-            <a:ext cx="1640877" cy="1246495"/>
-          </a:xfrm>
-          <a:prstGeom prst="rect">
-            <a:avLst/>
-          </a:prstGeom>
-          <a:noFill/>
-        </p:spPr>
-        <p:txBody>
-          <a:bodyPr wrap="square" rtlCol="0">
-            <a:spAutoFit/>
-          </a:bodyPr>
-          <a:lstStyle/>
-          <a:p>
-            <a:r>
-              <a:rPr lang="it-IT" sz="1500" dirty="0"/>
-              <a:t>ASSEMBLER </a:t>
-            </a:r>
-          </a:p>
-          <a:p>
-            <a:r>
-              <a:rPr lang="it-IT" sz="1500" dirty="0"/>
-              <a:t>DI RICHIESTE/</a:t>
-            </a:r>
-          </a:p>
-          <a:p>
-            <a:r>
-              <a:rPr lang="it-IT" sz="1500" dirty="0"/>
-              <a:t>RISPOSTE SEMPLIFICATE (DTO)</a:t>
-            </a:r>
-          </a:p>
-        </p:txBody>
-      </p:sp>
-      <p:sp>
-        <p:nvSpPr>
-          <p:cNvPr id="72" name="CasellaDiTesto 71">
-            <a:extLst>
-              <a:ext uri="{FF2B5EF4-FFF2-40B4-BE49-F238E27FC236}">
-                <a16:creationId xmlns:a16="http://schemas.microsoft.com/office/drawing/2014/main" id="{E0BB9481-2BC6-00D8-35F9-4155E020DABF}"/>
-              </a:ext>
-            </a:extLst>
-          </p:cNvPr>
-          <p:cNvSpPr txBox="1"/>
-          <p:nvPr/>
-        </p:nvSpPr>
-        <p:spPr>
-          <a:xfrm>
-            <a:off x="4806166" y="3647782"/>
-            <a:ext cx="1909296" cy="323165"/>
-          </a:xfrm>
-          <a:prstGeom prst="rect">
-            <a:avLst/>
-          </a:prstGeom>
-          <a:noFill/>
-        </p:spPr>
-        <p:txBody>
-          <a:bodyPr wrap="square" rtlCol="0">
-            <a:spAutoFit/>
-          </a:bodyPr>
-          <a:lstStyle/>
-          <a:p>
-            <a:r>
-              <a:rPr lang="it-IT" sz="1500" dirty="0"/>
-              <a:t>RATE LIMITER</a:t>
-            </a:r>
-          </a:p>
-        </p:txBody>
-      </p:sp>
-      <p:cxnSp>
-        <p:nvCxnSpPr>
-          <p:cNvPr id="73" name="Connettore 2 72">
-            <a:extLst>
-              <a:ext uri="{FF2B5EF4-FFF2-40B4-BE49-F238E27FC236}">
-                <a16:creationId xmlns:a16="http://schemas.microsoft.com/office/drawing/2014/main" id="{2FAC88F9-3BAA-9EA9-E72C-72DFDF497F9B}"/>
-              </a:ext>
-            </a:extLst>
-          </p:cNvPr>
-          <p:cNvCxnSpPr>
-            <a:cxnSpLocks/>
-            <a:stCxn id="30" idx="3"/>
-            <a:endCxn id="33" idx="0"/>
-          </p:cNvCxnSpPr>
-          <p:nvPr/>
-        </p:nvCxnSpPr>
-        <p:spPr>
-          <a:xfrm>
-            <a:off x="9495773" y="1413050"/>
-            <a:ext cx="1739741" cy="1573282"/>
-          </a:xfrm>
-          <a:prstGeom prst="straightConnector1">
-            <a:avLst/>
-          </a:prstGeom>
-          <a:ln>
-            <a:headEnd type="triangle"/>
             <a:tailEnd type="triangle"/>
           </a:ln>
         </p:spPr>
@@ -4172,30 +4140,29 @@
       </p:cxnSp>
       <p:cxnSp>
         <p:nvCxnSpPr>
-          <p:cNvPr id="80" name="Connettore 2 79">
-            <a:extLst>
-              <a:ext uri="{FF2B5EF4-FFF2-40B4-BE49-F238E27FC236}">
-                <a16:creationId xmlns:a16="http://schemas.microsoft.com/office/drawing/2014/main" id="{C69B4ECB-7FE0-4934-EA0A-96B5AD71E017}"/>
+          <p:cNvPr id="16" name="Connettore 2 15">
+            <a:extLst>
+              <a:ext uri="{FF2B5EF4-FFF2-40B4-BE49-F238E27FC236}">
+                <a16:creationId xmlns:a16="http://schemas.microsoft.com/office/drawing/2014/main" id="{C14F2B3F-9A8E-D530-7021-CAE86FE7C0EF}"/>
               </a:ext>
             </a:extLst>
           </p:cNvPr>
           <p:cNvCxnSpPr>
             <a:cxnSpLocks/>
-            <a:stCxn id="19" idx="3"/>
-            <a:endCxn id="33" idx="1"/>
+            <a:stCxn id="6" idx="3"/>
+            <a:endCxn id="19" idx="1"/>
           </p:cNvCxnSpPr>
           <p:nvPr/>
         </p:nvCxnSpPr>
         <p:spPr>
           <a:xfrm>
-            <a:off x="6175369" y="3312966"/>
-            <a:ext cx="4346539" cy="36026"/>
+            <a:off x="4487465" y="3312963"/>
+            <a:ext cx="789223" cy="0"/>
           </a:xfrm>
           <a:prstGeom prst="straightConnector1">
             <a:avLst/>
           </a:prstGeom>
           <a:ln>
-            <a:headEnd type="triangle"/>
             <a:tailEnd type="triangle"/>
           </a:ln>
         </p:spPr>
@@ -4216,30 +4183,29 @@
       </p:cxnSp>
       <p:cxnSp>
         <p:nvCxnSpPr>
-          <p:cNvPr id="86" name="Connettore 2 85">
-            <a:extLst>
-              <a:ext uri="{FF2B5EF4-FFF2-40B4-BE49-F238E27FC236}">
-                <a16:creationId xmlns:a16="http://schemas.microsoft.com/office/drawing/2014/main" id="{4C5FB970-B24A-333B-D6C7-864446B617C6}"/>
+          <p:cNvPr id="20" name="Connettore 2 19">
+            <a:extLst>
+              <a:ext uri="{FF2B5EF4-FFF2-40B4-BE49-F238E27FC236}">
+                <a16:creationId xmlns:a16="http://schemas.microsoft.com/office/drawing/2014/main" id="{8E73667A-A39B-4DDF-CB40-FACE0296EA91}"/>
               </a:ext>
             </a:extLst>
           </p:cNvPr>
           <p:cNvCxnSpPr>
             <a:cxnSpLocks/>
             <a:stCxn id="19" idx="3"/>
-            <a:endCxn id="41" idx="1"/>
+            <a:endCxn id="30" idx="1"/>
           </p:cNvCxnSpPr>
           <p:nvPr/>
         </p:nvCxnSpPr>
         <p:spPr>
-          <a:xfrm>
-            <a:off x="6175369" y="3312966"/>
-            <a:ext cx="2096372" cy="1573283"/>
+          <a:xfrm flipV="1">
+            <a:off x="6692533" y="1745900"/>
+            <a:ext cx="1050361" cy="1567063"/>
           </a:xfrm>
           <a:prstGeom prst="straightConnector1">
             <a:avLst/>
           </a:prstGeom>
           <a:ln>
-            <a:headEnd type="triangle"/>
             <a:tailEnd type="triangle"/>
           </a:ln>
         </p:spPr>
@@ -4260,30 +4226,29 @@
       </p:cxnSp>
       <p:cxnSp>
         <p:nvCxnSpPr>
-          <p:cNvPr id="114" name="Connettore 2 113">
-            <a:extLst>
-              <a:ext uri="{FF2B5EF4-FFF2-40B4-BE49-F238E27FC236}">
-                <a16:creationId xmlns:a16="http://schemas.microsoft.com/office/drawing/2014/main" id="{CD08305C-F0EE-95BA-71F5-8CD2FCA36579}"/>
+          <p:cNvPr id="23" name="Connettore 2 22">
+            <a:extLst>
+              <a:ext uri="{FF2B5EF4-FFF2-40B4-BE49-F238E27FC236}">
+                <a16:creationId xmlns:a16="http://schemas.microsoft.com/office/drawing/2014/main" id="{49B8DBA1-BFD9-E2CF-0793-4300016AB195}"/>
               </a:ext>
             </a:extLst>
           </p:cNvPr>
           <p:cNvCxnSpPr>
             <a:cxnSpLocks/>
             <a:stCxn id="19" idx="3"/>
-            <a:endCxn id="30" idx="1"/>
+            <a:endCxn id="33" idx="1"/>
           </p:cNvCxnSpPr>
           <p:nvPr/>
         </p:nvCxnSpPr>
         <p:spPr>
-          <a:xfrm flipV="1">
-            <a:off x="6175369" y="1413050"/>
-            <a:ext cx="1955177" cy="1899916"/>
+          <a:xfrm>
+            <a:off x="6692533" y="3312963"/>
+            <a:ext cx="3592009" cy="0"/>
           </a:xfrm>
           <a:prstGeom prst="straightConnector1">
             <a:avLst/>
           </a:prstGeom>
           <a:ln>
-            <a:headEnd type="triangle"/>
             <a:tailEnd type="triangle"/>
           </a:ln>
         </p:spPr>
@@ -4304,30 +4269,29 @@
       </p:cxnSp>
       <p:cxnSp>
         <p:nvCxnSpPr>
-          <p:cNvPr id="27" name="Connettore 2 26">
-            <a:extLst>
-              <a:ext uri="{FF2B5EF4-FFF2-40B4-BE49-F238E27FC236}">
-                <a16:creationId xmlns:a16="http://schemas.microsoft.com/office/drawing/2014/main" id="{FC645088-59A7-058B-7290-2E7844AA5454}"/>
+          <p:cNvPr id="26" name="Connettore 2 25">
+            <a:extLst>
+              <a:ext uri="{FF2B5EF4-FFF2-40B4-BE49-F238E27FC236}">
+                <a16:creationId xmlns:a16="http://schemas.microsoft.com/office/drawing/2014/main" id="{595329A7-B6F8-E8DE-3C1C-2F673E111CA5}"/>
               </a:ext>
             </a:extLst>
           </p:cNvPr>
           <p:cNvCxnSpPr>
             <a:cxnSpLocks/>
-            <a:stCxn id="41" idx="3"/>
-            <a:endCxn id="33" idx="2"/>
+            <a:stCxn id="19" idx="3"/>
+            <a:endCxn id="41" idx="1"/>
           </p:cNvCxnSpPr>
           <p:nvPr/>
         </p:nvCxnSpPr>
         <p:spPr>
-          <a:xfrm flipV="1">
-            <a:off x="9354576" y="3711652"/>
-            <a:ext cx="1880938" cy="1174597"/>
+          <a:xfrm>
+            <a:off x="6692533" y="3312963"/>
+            <a:ext cx="1185241" cy="1386098"/>
           </a:xfrm>
           <a:prstGeom prst="straightConnector1">
             <a:avLst/>
           </a:prstGeom>
           <a:ln>
-            <a:headEnd type="triangle"/>
             <a:tailEnd type="triangle"/>
           </a:ln>
         </p:spPr>
@@ -4348,30 +4312,29 @@
       </p:cxnSp>
       <p:cxnSp>
         <p:nvCxnSpPr>
-          <p:cNvPr id="36" name="Connettore 2 35">
-            <a:extLst>
-              <a:ext uri="{FF2B5EF4-FFF2-40B4-BE49-F238E27FC236}">
-                <a16:creationId xmlns:a16="http://schemas.microsoft.com/office/drawing/2014/main" id="{85851779-F5EC-7BD7-731E-BEBE195FF274}"/>
+          <p:cNvPr id="31" name="Connettore 2 30">
+            <a:extLst>
+              <a:ext uri="{FF2B5EF4-FFF2-40B4-BE49-F238E27FC236}">
+                <a16:creationId xmlns:a16="http://schemas.microsoft.com/office/drawing/2014/main" id="{FC69FAB3-0726-5F73-D96F-246133A18F78}"/>
               </a:ext>
             </a:extLst>
           </p:cNvPr>
           <p:cNvCxnSpPr>
             <a:cxnSpLocks/>
-            <a:stCxn id="41" idx="0"/>
-            <a:endCxn id="30" idx="2"/>
+            <a:stCxn id="30" idx="3"/>
+            <a:endCxn id="33" idx="0"/>
           </p:cNvCxnSpPr>
           <p:nvPr/>
         </p:nvCxnSpPr>
         <p:spPr>
-          <a:xfrm flipV="1">
-            <a:off x="8813159" y="1984162"/>
-            <a:ext cx="1" cy="2539427"/>
+          <a:xfrm>
+            <a:off x="10284542" y="1745900"/>
+            <a:ext cx="847037" cy="1062364"/>
           </a:xfrm>
           <a:prstGeom prst="straightConnector1">
             <a:avLst/>
           </a:prstGeom>
           <a:ln>
-            <a:headEnd type="triangle"/>
             <a:tailEnd type="triangle"/>
           </a:ln>
         </p:spPr>
@@ -4390,6 +4353,87 @@
           </a:fontRef>
         </p:style>
       </p:cxnSp>
+      <p:cxnSp>
+        <p:nvCxnSpPr>
+          <p:cNvPr id="35" name="Connettore 2 34">
+            <a:extLst>
+              <a:ext uri="{FF2B5EF4-FFF2-40B4-BE49-F238E27FC236}">
+                <a16:creationId xmlns:a16="http://schemas.microsoft.com/office/drawing/2014/main" id="{41A82F6C-91BC-7F2A-EFBF-283192D871ED}"/>
+              </a:ext>
+            </a:extLst>
+          </p:cNvPr>
+          <p:cNvCxnSpPr>
+            <a:cxnSpLocks/>
+            <a:stCxn id="33" idx="2"/>
+            <a:endCxn id="41" idx="3"/>
+          </p:cNvCxnSpPr>
+          <p:nvPr/>
+        </p:nvCxnSpPr>
+        <p:spPr>
+          <a:xfrm flipH="1">
+            <a:off x="9748545" y="3817661"/>
+            <a:ext cx="1383034" cy="881400"/>
+          </a:xfrm>
+          <a:prstGeom prst="straightConnector1">
+            <a:avLst/>
+          </a:prstGeom>
+          <a:ln>
+            <a:tailEnd type="triangle"/>
+          </a:ln>
+        </p:spPr>
+        <p:style>
+          <a:lnRef idx="2">
+            <a:schemeClr val="accent1"/>
+          </a:lnRef>
+          <a:fillRef idx="0">
+            <a:schemeClr val="accent1"/>
+          </a:fillRef>
+          <a:effectRef idx="1">
+            <a:schemeClr val="accent1"/>
+          </a:effectRef>
+          <a:fontRef idx="minor">
+            <a:schemeClr val="tx1"/>
+          </a:fontRef>
+        </p:style>
+      </p:cxnSp>
+      <p:sp>
+        <p:nvSpPr>
+          <p:cNvPr id="60" name="CasellaDiTesto 59">
+            <a:extLst>
+              <a:ext uri="{FF2B5EF4-FFF2-40B4-BE49-F238E27FC236}">
+                <a16:creationId xmlns:a16="http://schemas.microsoft.com/office/drawing/2014/main" id="{315EDFCD-94A6-3417-E77A-7B6C143B63F2}"/>
+              </a:ext>
+            </a:extLst>
+          </p:cNvPr>
+          <p:cNvSpPr txBox="1"/>
+          <p:nvPr/>
+        </p:nvSpPr>
+        <p:spPr>
+          <a:xfrm>
+            <a:off x="1171688" y="2661643"/>
+            <a:ext cx="874059" cy="400110"/>
+          </a:xfrm>
+          <a:prstGeom prst="rect">
+            <a:avLst/>
+          </a:prstGeom>
+          <a:noFill/>
+        </p:spPr>
+        <p:txBody>
+          <a:bodyPr wrap="square" rtlCol="0">
+            <a:spAutoFit/>
+          </a:bodyPr>
+          <a:lstStyle/>
+          <a:p>
+            <a:r>
+              <a:rPr lang="it-IT" sz="2000" b="1" i="1" dirty="0">
+                <a:latin typeface="Times New Roman" panose="02020603050405020304" pitchFamily="18" charset="0"/>
+                <a:cs typeface="Times New Roman" panose="02020603050405020304" pitchFamily="18" charset="0"/>
+              </a:rPr>
+              <a:t>DTO</a:t>
+            </a:r>
+          </a:p>
+        </p:txBody>
+      </p:sp>
     </p:spTree>
     <p:extLst>
       <p:ext uri="{BB962C8B-B14F-4D97-AF65-F5344CB8AC3E}">

</xml_diff>